<commit_message>
edit arithmetic-sums integral-estimate geometric-sums.pptx
</commit_message>
<xml_diff>
--- a/spring13/slides13/arithmetic-sums.pptx
+++ b/spring13/slides13/arithmetic-sums.pptx
@@ -5,10 +5,10 @@
     <p:sldMasterId id="2147483648" r:id="rId1"/>
   </p:sldMasterIdLst>
   <p:notesMasterIdLst>
-    <p:notesMasterId r:id="rId11"/>
+    <p:notesMasterId r:id="rId12"/>
   </p:notesMasterIdLst>
   <p:handoutMasterIdLst>
-    <p:handoutMasterId r:id="rId12"/>
+    <p:handoutMasterId r:id="rId13"/>
   </p:handoutMasterIdLst>
   <p:sldIdLst>
     <p:sldId id="361" r:id="rId2"/>
@@ -18,13 +18,14 @@
     <p:sldId id="340" r:id="rId6"/>
     <p:sldId id="341" r:id="rId7"/>
     <p:sldId id="362" r:id="rId8"/>
-    <p:sldId id="363" r:id="rId9"/>
-    <p:sldId id="308" r:id="rId10"/>
+    <p:sldId id="364" r:id="rId9"/>
+    <p:sldId id="363" r:id="rId10"/>
+    <p:sldId id="308" r:id="rId11"/>
   </p:sldIdLst>
   <p:sldSz cx="9144000" cy="6858000" type="screen4x3"/>
   <p:notesSz cx="9601200" cy="7315200"/>
   <p:custDataLst>
-    <p:tags r:id="rId14"/>
+    <p:tags r:id="rId15"/>
   </p:custDataLst>
   <p:defaultTextStyle>
     <a:defPPr>
@@ -1746,10 +1747,99 @@
           <a:bodyPr/>
           <a:lstStyle/>
           <a:p>
+            <a:fld id="{E27F3EFE-0ED4-3D42-9A16-24387988035E}" type="slidenum">
+              <a:rPr lang="en-US"/>
+              <a:pPr/>
+              <a:t>8</a:t>
+            </a:fld>
+            <a:endParaRPr lang="en-US"/>
+          </a:p>
+        </p:txBody>
+      </p:sp>
+      <p:sp>
+        <p:nvSpPr>
+          <p:cNvPr id="140290" name="Rectangle 2"/>
+          <p:cNvSpPr>
+            <a:spLocks noGrp="1" noRot="1" noChangeAspect="1" noChangeArrowheads="1" noTextEdit="1"/>
+          </p:cNvSpPr>
+          <p:nvPr>
+            <p:ph type="sldImg"/>
+          </p:nvPr>
+        </p:nvSpPr>
+        <p:spPr>
+          <a:ln/>
+          <a:extLst>
+            <a:ext uri="{FAA26D3D-D897-4be2-8F04-BA451C77F1D7}">
+              <ma14:placeholderFlag xmlns:ma14="http://schemas.microsoft.com/office/mac/drawingml/2011/main" val="1"/>
+            </a:ext>
+          </a:extLst>
+        </p:spPr>
+      </p:sp>
+      <p:sp>
+        <p:nvSpPr>
+          <p:cNvPr id="140291" name="Rectangle 3"/>
+          <p:cNvSpPr>
+            <a:spLocks noGrp="1" noChangeArrowheads="1"/>
+          </p:cNvSpPr>
+          <p:nvPr>
+            <p:ph type="body" idx="1"/>
+          </p:nvPr>
+        </p:nvSpPr>
+        <p:spPr/>
+        <p:txBody>
+          <a:bodyPr/>
+          <a:lstStyle/>
+          <a:p>
+            <a:endParaRPr lang="en-US"/>
+          </a:p>
+        </p:txBody>
+      </p:sp>
+    </p:spTree>
+  </p:cSld>
+  <p:clrMapOvr>
+    <a:masterClrMapping/>
+  </p:clrMapOvr>
+</p:notes>
+</file>
+
+<file path=ppt/notesSlides/notesSlide9.xml><?xml version="1.0" encoding="utf-8"?>
+<p:notes xmlns:a="http://schemas.openxmlformats.org/drawingml/2006/main" xmlns:r="http://schemas.openxmlformats.org/officeDocument/2006/relationships" xmlns:p="http://schemas.openxmlformats.org/presentationml/2006/main">
+  <p:cSld>
+    <p:spTree>
+      <p:nvGrpSpPr>
+        <p:cNvPr id="1" name=""/>
+        <p:cNvGrpSpPr/>
+        <p:nvPr/>
+      </p:nvGrpSpPr>
+      <p:grpSpPr>
+        <a:xfrm>
+          <a:off x="0" y="0"/>
+          <a:ext cx="0" cy="0"/>
+          <a:chOff x="0" y="0"/>
+          <a:chExt cx="0" cy="0"/>
+        </a:xfrm>
+      </p:grpSpPr>
+      <p:sp>
+        <p:nvSpPr>
+          <p:cNvPr id="7" name="Rectangle 7"/>
+          <p:cNvSpPr>
+            <a:spLocks noGrp="1" noChangeArrowheads="1"/>
+          </p:cNvSpPr>
+          <p:nvPr>
+            <p:ph type="sldNum" sz="quarter" idx="5"/>
+          </p:nvPr>
+        </p:nvSpPr>
+        <p:spPr>
+          <a:ln/>
+        </p:spPr>
+        <p:txBody>
+          <a:bodyPr/>
+          <a:lstStyle/>
+          <a:p>
             <a:fld id="{93C81DC8-1251-A04D-9633-B2ABACAEF91D}" type="slidenum">
               <a:rPr lang="en-US"/>
               <a:pPr/>
-              <a:t>9</a:t>
+              <a:t>10</a:t>
             </a:fld>
             <a:endParaRPr lang="en-US"/>
           </a:p>
@@ -3655,6 +3745,440 @@
 </p:sld>
 </file>
 
+<file path=ppt/slides/slide10.xml><?xml version="1.0" encoding="utf-8"?>
+<p:sld xmlns:a="http://schemas.openxmlformats.org/drawingml/2006/main" xmlns:r="http://schemas.openxmlformats.org/officeDocument/2006/relationships" xmlns:p="http://schemas.openxmlformats.org/presentationml/2006/main">
+  <p:cSld>
+    <p:spTree>
+      <p:nvGrpSpPr>
+        <p:cNvPr id="1" name=""/>
+        <p:cNvGrpSpPr/>
+        <p:nvPr/>
+      </p:nvGrpSpPr>
+      <p:grpSpPr>
+        <a:xfrm>
+          <a:off x="0" y="0"/>
+          <a:ext cx="0" cy="0"/>
+          <a:chOff x="0" y="0"/>
+          <a:chExt cx="0" cy="0"/>
+        </a:xfrm>
+      </p:grpSpPr>
+      <p:sp>
+        <p:nvSpPr>
+          <p:cNvPr id="56322" name="Rectangle 2"/>
+          <p:cNvSpPr>
+            <a:spLocks noGrp="1" noChangeArrowheads="1"/>
+          </p:cNvSpPr>
+          <p:nvPr>
+            <p:ph type="title"/>
+          </p:nvPr>
+        </p:nvSpPr>
+        <p:spPr/>
+        <p:txBody>
+          <a:bodyPr/>
+          <a:lstStyle/>
+          <a:p>
+            <a:r>
+              <a:rPr lang="en-US"/>
+              <a:t>Sum for Children</a:t>
+            </a:r>
+          </a:p>
+        </p:txBody>
+      </p:sp>
+      <p:sp>
+        <p:nvSpPr>
+          <p:cNvPr id="56330" name="Text Box 10"/>
+          <p:cNvSpPr txBox="1">
+            <a:spLocks noChangeArrowheads="1"/>
+          </p:cNvSpPr>
+          <p:nvPr/>
+        </p:nvSpPr>
+        <p:spPr bwMode="auto">
+          <a:xfrm>
+            <a:off x="914400" y="1611313"/>
+            <a:ext cx="2531237" cy="769441"/>
+          </a:xfrm>
+          <a:prstGeom prst="rect">
+            <a:avLst/>
+          </a:prstGeom>
+          <a:noFill/>
+          <a:ln>
+            <a:noFill/>
+          </a:ln>
+          <a:effectLst/>
+          <a:extLst>
+            <a:ext uri="{909E8E84-426E-40dd-AFC4-6F175D3DCCD1}">
+              <a14:hiddenFill xmlns:a14="http://schemas.microsoft.com/office/drawing/2010/main">
+                <a:solidFill>
+                  <a:schemeClr val="accent1"/>
+                </a:solidFill>
+              </a14:hiddenFill>
+            </a:ext>
+            <a:ext uri="{91240B29-F687-4f45-9708-019B960494DF}">
+              <a14:hiddenLine xmlns:a14="http://schemas.microsoft.com/office/drawing/2010/main" w="9525">
+                <a:solidFill>
+                  <a:schemeClr val="tx1"/>
+                </a:solidFill>
+                <a:miter lim="800000"/>
+                <a:headEnd/>
+                <a:tailEnd/>
+              </a14:hiddenLine>
+            </a:ext>
+            <a:ext uri="{AF507438-7753-43e0-B8FC-AC1667EBCBE1}">
+              <a14:hiddenEffects xmlns:a14="http://schemas.microsoft.com/office/drawing/2010/main">
+                <a:effectLst>
+                  <a:outerShdw blurRad="63500" dist="38099" dir="2700000" algn="ctr" rotWithShape="0">
+                    <a:schemeClr val="bg2">
+                      <a:alpha val="74998"/>
+                    </a:schemeClr>
+                  </a:outerShdw>
+                </a:effectLst>
+              </a14:hiddenEffects>
+            </a:ext>
+          </a:extLst>
+        </p:spPr>
+        <p:txBody>
+          <a:bodyPr wrap="none">
+            <a:spAutoFit/>
+          </a:bodyPr>
+          <a:lstStyle/>
+          <a:p>
+            <a:r>
+              <a:rPr lang="en-US" sz="4400" dirty="0">
+                <a:solidFill>
+                  <a:srgbClr val="9D007C"/>
+                </a:solidFill>
+                <a:latin typeface="Comic Sans MS" charset="0"/>
+              </a:rPr>
+              <a:t>Example:</a:t>
+            </a:r>
+          </a:p>
+        </p:txBody>
+      </p:sp>
+      <p:sp>
+        <p:nvSpPr>
+          <p:cNvPr id="56331" name="Text Box 11"/>
+          <p:cNvSpPr txBox="1">
+            <a:spLocks noChangeArrowheads="1"/>
+          </p:cNvSpPr>
+          <p:nvPr/>
+        </p:nvSpPr>
+        <p:spPr bwMode="auto">
+          <a:xfrm>
+            <a:off x="533400" y="2438400"/>
+            <a:ext cx="8077200" cy="1015663"/>
+          </a:xfrm>
+          <a:prstGeom prst="rect">
+            <a:avLst/>
+          </a:prstGeom>
+          <a:noFill/>
+          <a:ln>
+            <a:noFill/>
+          </a:ln>
+          <a:effectLst/>
+          <a:extLst>
+            <a:ext uri="{909E8E84-426E-40dd-AFC4-6F175D3DCCD1}">
+              <a14:hiddenFill xmlns:a14="http://schemas.microsoft.com/office/drawing/2010/main">
+                <a:solidFill>
+                  <a:schemeClr val="accent1"/>
+                </a:solidFill>
+              </a14:hiddenFill>
+            </a:ext>
+            <a:ext uri="{91240B29-F687-4f45-9708-019B960494DF}">
+              <a14:hiddenLine xmlns:a14="http://schemas.microsoft.com/office/drawing/2010/main" w="9525">
+                <a:solidFill>
+                  <a:schemeClr val="tx1"/>
+                </a:solidFill>
+                <a:miter lim="800000"/>
+                <a:headEnd/>
+                <a:tailEnd/>
+              </a14:hiddenLine>
+            </a:ext>
+            <a:ext uri="{AF507438-7753-43e0-B8FC-AC1667EBCBE1}">
+              <a14:hiddenEffects xmlns:a14="http://schemas.microsoft.com/office/drawing/2010/main">
+                <a:effectLst>
+                  <a:outerShdw blurRad="63500" dist="38099" dir="2700000" algn="ctr" rotWithShape="0">
+                    <a:schemeClr val="bg2">
+                      <a:alpha val="74998"/>
+                    </a:schemeClr>
+                  </a:outerShdw>
+                </a:effectLst>
+              </a14:hiddenEffects>
+            </a:ext>
+          </a:extLst>
+        </p:spPr>
+        <p:txBody>
+          <a:bodyPr wrap="square">
+            <a:spAutoFit/>
+          </a:bodyPr>
+          <a:lstStyle/>
+          <a:p>
+            <a:pPr eaLnBrk="1" hangingPunct="1">
+              <a:spcBef>
+                <a:spcPct val="20000"/>
+              </a:spcBef>
+            </a:pPr>
+            <a:r>
+              <a:rPr lang="en-US" sz="6000" dirty="0" smtClean="0">
+                <a:solidFill>
+                  <a:srgbClr val="3333FF"/>
+                </a:solidFill>
+                <a:latin typeface="Comic Sans MS" charset="0"/>
+              </a:rPr>
+              <a:t>1 </a:t>
+            </a:r>
+            <a:r>
+              <a:rPr lang="en-US" sz="6000" dirty="0">
+                <a:solidFill>
+                  <a:srgbClr val="3333FF"/>
+                </a:solidFill>
+                <a:latin typeface="Comic Sans MS" charset="0"/>
+              </a:rPr>
+              <a:t>+ 2 + </a:t>
+            </a:r>
+            <a:r>
+              <a:rPr lang="en-US" sz="6000" dirty="0" smtClean="0">
+                <a:solidFill>
+                  <a:srgbClr val="3333FF"/>
+                </a:solidFill>
+                <a:latin typeface="DFKaiShu-SB-Estd-BF"/>
+              </a:rPr>
+              <a:t>…</a:t>
+            </a:r>
+            <a:r>
+              <a:rPr lang="en-US" sz="6000" dirty="0" smtClean="0">
+                <a:solidFill>
+                  <a:srgbClr val="3333FF"/>
+                </a:solidFill>
+                <a:latin typeface="Comic Sans MS" charset="0"/>
+              </a:rPr>
+              <a:t> </a:t>
+            </a:r>
+            <a:r>
+              <a:rPr lang="en-US" sz="6000" dirty="0">
+                <a:solidFill>
+                  <a:srgbClr val="3333FF"/>
+                </a:solidFill>
+                <a:latin typeface="Comic Sans MS" charset="0"/>
+              </a:rPr>
+              <a:t>+ (</a:t>
+            </a:r>
+            <a:r>
+              <a:rPr lang="en-US" sz="6000" dirty="0" smtClean="0">
+                <a:solidFill>
+                  <a:srgbClr val="3333FF"/>
+                </a:solidFill>
+                <a:latin typeface="Comic Sans MS" charset="0"/>
+              </a:rPr>
+              <a:t>n</a:t>
+            </a:r>
+            <a:r>
+              <a:rPr lang="en-US" sz="6000" dirty="0" smtClean="0">
+                <a:solidFill>
+                  <a:srgbClr val="3333FF"/>
+                </a:solidFill>
+                <a:latin typeface="Comic Sans MS" charset="0"/>
+                <a:sym typeface="Symbol" charset="0"/>
+              </a:rPr>
+              <a:t>-</a:t>
+            </a:r>
+            <a:r>
+              <a:rPr lang="en-US" sz="6000" dirty="0" smtClean="0">
+                <a:solidFill>
+                  <a:srgbClr val="3333FF"/>
+                </a:solidFill>
+                <a:latin typeface="Comic Sans MS" charset="0"/>
+              </a:rPr>
+              <a:t>1</a:t>
+            </a:r>
+            <a:r>
+              <a:rPr lang="en-US" sz="6000" dirty="0">
+                <a:solidFill>
+                  <a:srgbClr val="3333FF"/>
+                </a:solidFill>
+                <a:latin typeface="Comic Sans MS" charset="0"/>
+              </a:rPr>
+              <a:t>) + n </a:t>
+            </a:r>
+            <a:r>
+              <a:rPr lang="en-US" sz="6000" b="1" dirty="0" smtClean="0">
+                <a:solidFill>
+                  <a:srgbClr val="3333FF"/>
+                </a:solidFill>
+                <a:latin typeface="Euclid Symbol" charset="2"/>
+                <a:cs typeface="Euclid Symbol" charset="2"/>
+              </a:rPr>
+              <a:t>=</a:t>
+            </a:r>
+            <a:endParaRPr lang="en-US" sz="2800" b="1" dirty="0">
+              <a:solidFill>
+                <a:srgbClr val="3333FF"/>
+              </a:solidFill>
+              <a:latin typeface="Euclid Symbol" charset="2"/>
+              <a:cs typeface="Euclid Symbol" charset="2"/>
+            </a:endParaRPr>
+          </a:p>
+        </p:txBody>
+      </p:sp>
+      <p:graphicFrame>
+        <p:nvGraphicFramePr>
+          <p:cNvPr id="2" name="Object 1"/>
+          <p:cNvGraphicFramePr>
+            <a:graphicFrameLocks noChangeAspect="1"/>
+          </p:cNvGraphicFramePr>
+          <p:nvPr>
+            <p:extLst>
+              <p:ext uri="{D42A27DB-BD31-4B8C-83A1-F6EECF244321}">
+                <p14:modId xmlns:p14="http://schemas.microsoft.com/office/powerpoint/2010/main" val="200363704"/>
+              </p:ext>
+            </p:extLst>
+          </p:nvPr>
+        </p:nvGraphicFramePr>
+        <p:xfrm>
+          <a:off x="3105596" y="3505200"/>
+          <a:ext cx="2838004" cy="2514600"/>
+        </p:xfrm>
+        <a:graphic>
+          <a:graphicData uri="http://schemas.openxmlformats.org/presentationml/2006/ole">
+            <mc:AlternateContent xmlns:mc="http://schemas.openxmlformats.org/markup-compatibility/2006">
+              <mc:Choice xmlns:v="urn:schemas-microsoft-com:vml" Requires="v">
+                <p:oleObj spid="_x0000_s98306" name="Equation" r:id="rId4" imgW="520700" imgH="469900" progId="Equation.DSMT4">
+                  <p:embed/>
+                </p:oleObj>
+              </mc:Choice>
+              <mc:Fallback>
+                <p:oleObj name="Equation" r:id="rId4" imgW="520700" imgH="469900" progId="Equation.DSMT4">
+                  <p:embed/>
+                  <p:pic>
+                    <p:nvPicPr>
+                      <p:cNvPr id="0" name=""/>
+                      <p:cNvPicPr/>
+                      <p:nvPr/>
+                    </p:nvPicPr>
+                    <p:blipFill>
+                      <a:blip r:embed="rId5"/>
+                      <a:stretch>
+                        <a:fillRect/>
+                      </a:stretch>
+                    </p:blipFill>
+                    <p:spPr>
+                      <a:xfrm>
+                        <a:off x="3105596" y="3505200"/>
+                        <a:ext cx="2838004" cy="2514600"/>
+                      </a:xfrm>
+                      <a:prstGeom prst="rect">
+                        <a:avLst/>
+                      </a:prstGeom>
+                    </p:spPr>
+                  </p:pic>
+                </p:oleObj>
+              </mc:Fallback>
+            </mc:AlternateContent>
+          </a:graphicData>
+        </a:graphic>
+      </p:graphicFrame>
+    </p:spTree>
+  </p:cSld>
+  <p:clrMapOvr>
+    <a:masterClrMapping/>
+  </p:clrMapOvr>
+  <mc:AlternateContent xmlns:mc="http://schemas.openxmlformats.org/markup-compatibility/2006" xmlns:p14="http://schemas.microsoft.com/office/powerpoint/2010/main">
+    <mc:Choice Requires="p14">
+      <p:transition spd="slow" p14:dur="800">
+        <p:fade thruBlk="1"/>
+      </p:transition>
+    </mc:Choice>
+    <mc:Fallback xmlns="">
+      <p:transition xmlns:p14="http://schemas.microsoft.com/office/powerpoint/2010/main" spd="slow">
+        <p:fade thruBlk="1"/>
+      </p:transition>
+    </mc:Fallback>
+  </mc:AlternateContent>
+  <p:timing>
+    <p:tnLst>
+      <p:par>
+        <p:cTn xmlns:p14="http://schemas.microsoft.com/office/powerpoint/2010/main" id="1" dur="indefinite" restart="never" nodeType="tmRoot">
+          <p:childTnLst>
+            <p:seq concurrent="1" nextAc="seek">
+              <p:cTn id="2" dur="indefinite" nodeType="mainSeq">
+                <p:childTnLst>
+                  <p:par>
+                    <p:cTn id="3" fill="hold">
+                      <p:stCondLst>
+                        <p:cond delay="indefinite"/>
+                      </p:stCondLst>
+                      <p:childTnLst>
+                        <p:par>
+                          <p:cTn id="4" fill="hold">
+                            <p:stCondLst>
+                              <p:cond delay="0"/>
+                            </p:stCondLst>
+                            <p:childTnLst>
+                              <p:par>
+                                <p:cTn id="5" presetID="10" presetClass="entr" presetSubtype="0" fill="hold" nodeType="clickEffect">
+                                  <p:stCondLst>
+                                    <p:cond delay="0"/>
+                                  </p:stCondLst>
+                                  <p:childTnLst>
+                                    <p:set>
+                                      <p:cBhvr>
+                                        <p:cTn id="6" dur="1" fill="hold">
+                                          <p:stCondLst>
+                                            <p:cond delay="0"/>
+                                          </p:stCondLst>
+                                        </p:cTn>
+                                        <p:tgtEl>
+                                          <p:spTgt spid="2"/>
+                                        </p:tgtEl>
+                                        <p:attrNameLst>
+                                          <p:attrName>style.visibility</p:attrName>
+                                        </p:attrNameLst>
+                                      </p:cBhvr>
+                                      <p:to>
+                                        <p:strVal val="visible"/>
+                                      </p:to>
+                                    </p:set>
+                                    <p:animEffect transition="in" filter="fade">
+                                      <p:cBhvr>
+                                        <p:cTn id="7" dur="500"/>
+                                        <p:tgtEl>
+                                          <p:spTgt spid="2"/>
+                                        </p:tgtEl>
+                                      </p:cBhvr>
+                                    </p:animEffect>
+                                  </p:childTnLst>
+                                </p:cTn>
+                              </p:par>
+                            </p:childTnLst>
+                          </p:cTn>
+                        </p:par>
+                      </p:childTnLst>
+                    </p:cTn>
+                  </p:par>
+                </p:childTnLst>
+              </p:cTn>
+              <p:prevCondLst>
+                <p:cond evt="onPrev" delay="0">
+                  <p:tgtEl>
+                    <p:sldTgt/>
+                  </p:tgtEl>
+                </p:cond>
+              </p:prevCondLst>
+              <p:nextCondLst>
+                <p:cond evt="onNext" delay="0">
+                  <p:tgtEl>
+                    <p:sldTgt/>
+                  </p:tgtEl>
+                </p:cond>
+              </p:nextCondLst>
+            </p:seq>
+          </p:childTnLst>
+        </p:cTn>
+      </p:par>
+    </p:tnLst>
+  </p:timing>
+</p:sld>
+</file>
+
 <file path=ppt/slides/slide2.xml><?xml version="1.0" encoding="utf-8"?>
 <p:sld xmlns:a="http://schemas.openxmlformats.org/drawingml/2006/main" xmlns:r="http://schemas.openxmlformats.org/officeDocument/2006/relationships" xmlns:p="http://schemas.openxmlformats.org/presentationml/2006/main">
   <p:cSld>
@@ -3826,18 +4350,9 @@
   <p:clrMapOvr>
     <a:masterClrMapping/>
   </p:clrMapOvr>
-  <mc:AlternateContent xmlns:mc="http://schemas.openxmlformats.org/markup-compatibility/2006" xmlns:p14="http://schemas.microsoft.com/office/powerpoint/2010/main">
-    <mc:Choice Requires="p14">
-      <p:transition spd="med" p14:dur="700" advClick="0">
-        <p:fade/>
-      </p:transition>
-    </mc:Choice>
-    <mc:Fallback xmlns="">
-      <p:transition xmlns:p14="http://schemas.microsoft.com/office/powerpoint/2010/main" spd="med" advClick="0">
-        <p:fade/>
-      </p:transition>
-    </mc:Fallback>
-  </mc:AlternateContent>
+  <p:transition xmlns:p14="http://schemas.microsoft.com/office/powerpoint/2010/main" spd="slow" advClick="0">
+    <p:fade thruBlk="1"/>
+  </p:transition>
   <p:timing>
     <p:tnLst>
       <p:par>
@@ -4010,18 +4525,9 @@
   <p:clrMapOvr>
     <a:masterClrMapping/>
   </p:clrMapOvr>
-  <mc:AlternateContent xmlns:mc="http://schemas.openxmlformats.org/markup-compatibility/2006" xmlns:p14="http://schemas.microsoft.com/office/powerpoint/2010/main">
-    <mc:Choice Requires="p14">
-      <p:transition spd="med" p14:dur="700">
-        <p:fade/>
-      </p:transition>
-    </mc:Choice>
-    <mc:Fallback xmlns="">
-      <p:transition xmlns:p14="http://schemas.microsoft.com/office/powerpoint/2010/main" spd="med">
-        <p:fade/>
-      </p:transition>
-    </mc:Fallback>
-  </mc:AlternateContent>
+  <p:transition xmlns:p14="http://schemas.microsoft.com/office/powerpoint/2010/main" spd="slow" advClick="0">
+    <p:fade thruBlk="1"/>
+  </p:transition>
   <p:timing>
     <p:tnLst>
       <p:par>
@@ -4152,14 +4658,14 @@
   <p:clrMapOvr>
     <a:masterClrMapping/>
   </p:clrMapOvr>
-  <mc:AlternateContent xmlns:mc="http://schemas.openxmlformats.org/markup-compatibility/2006" xmlns:p14="http://schemas.microsoft.com/office/powerpoint/2010/main">
-    <mc:Choice Requires="p14">
-      <p:transition spd="med" p14:dur="700" advClick="0">
+  <mc:AlternateContent xmlns:mc="http://schemas.openxmlformats.org/markup-compatibility/2006">
+    <mc:Choice xmlns:p14="http://schemas.microsoft.com/office/powerpoint/2010/main" Requires="p14">
+      <p:transition spd="slow" p14:dur="800" advClick="0">
         <p:fade/>
       </p:transition>
     </mc:Choice>
-    <mc:Fallback xmlns="">
-      <p:transition xmlns:p14="http://schemas.microsoft.com/office/powerpoint/2010/main" spd="med" advClick="0">
+    <mc:Fallback>
+      <p:transition xmlns:p14="http://schemas.microsoft.com/office/powerpoint/2010/main" spd="slow" advClick="0">
         <p:fade/>
       </p:transition>
     </mc:Fallback>
@@ -4530,12 +5036,12 @@
   </p:clrMapOvr>
   <mc:AlternateContent xmlns:mc="http://schemas.openxmlformats.org/markup-compatibility/2006">
     <mc:Choice xmlns:p14="http://schemas.microsoft.com/office/powerpoint/2010/main" Requires="p14">
-      <p:transition spd="med" p14:dur="700">
+      <p:transition spd="med" p14:dur="700" advClick="0">
         <p:fade/>
       </p:transition>
     </mc:Choice>
     <mc:Fallback>
-      <p:transition xmlns:p14="http://schemas.microsoft.com/office/powerpoint/2010/main" spd="med">
+      <p:transition xmlns:p14="http://schemas.microsoft.com/office/powerpoint/2010/main" spd="med" advClick="0">
         <p:fade/>
       </p:transition>
     </mc:Fallback>
@@ -4856,7 +5362,7 @@
           <a:graphicData uri="http://schemas.openxmlformats.org/presentationml/2006/ole">
             <mc:AlternateContent xmlns:mc="http://schemas.openxmlformats.org/markup-compatibility/2006">
               <mc:Choice xmlns:v="urn:schemas-microsoft-com:vml" Requires="v">
-                <p:oleObj spid="_x0000_s94274" name="Equation" r:id="rId4" imgW="1016000" imgH="495300" progId="Equation.DSMT4">
+                <p:oleObj spid="_x0000_s94279" name="Equation" r:id="rId4" imgW="1016000" imgH="495300" progId="Equation.DSMT4">
                   <p:embed/>
                 </p:oleObj>
               </mc:Choice>
@@ -5229,12 +5735,12 @@
   </p:clrMapOvr>
   <mc:AlternateContent xmlns:mc="http://schemas.openxmlformats.org/markup-compatibility/2006">
     <mc:Choice xmlns:p14="http://schemas.microsoft.com/office/powerpoint/2010/main" Requires="p14">
-      <p:transition spd="med" p14:dur="700">
+      <p:transition spd="med" p14:dur="700" advClick="0">
         <p:fade/>
       </p:transition>
     </mc:Choice>
     <mc:Fallback>
-      <p:transition xmlns:p14="http://schemas.microsoft.com/office/powerpoint/2010/main" spd="med">
+      <p:transition xmlns:p14="http://schemas.microsoft.com/office/powerpoint/2010/main" spd="med" advClick="0">
         <p:fade/>
       </p:transition>
     </mc:Fallback>
@@ -5929,7 +6435,7 @@
                 <a:latin typeface="Comic Sans MS"/>
                 <a:cs typeface="Comic Sans MS"/>
               </a:rPr>
-              <a:t>=::</a:t>
+              <a:t>=  </a:t>
             </a:r>
             <a:r>
               <a:rPr lang="en-US" sz="5400" dirty="0" smtClean="0">
@@ -6133,20 +6639,20 @@
           <p:nvPr>
             <p:extLst>
               <p:ext uri="{D42A27DB-BD31-4B8C-83A1-F6EECF244321}">
-                <p14:modId xmlns:p14="http://schemas.microsoft.com/office/powerpoint/2010/main" val="978290705"/>
+                <p14:modId xmlns:p14="http://schemas.microsoft.com/office/powerpoint/2010/main" val="2049806252"/>
               </p:ext>
             </p:extLst>
           </p:nvPr>
         </p:nvGraphicFramePr>
         <p:xfrm>
-          <a:off x="1676400" y="4648200"/>
+          <a:off x="1756832" y="4343400"/>
           <a:ext cx="5634568" cy="1676400"/>
         </p:xfrm>
         <a:graphic>
           <a:graphicData uri="http://schemas.openxmlformats.org/presentationml/2006/ole">
             <mc:AlternateContent xmlns:mc="http://schemas.openxmlformats.org/markup-compatibility/2006">
               <mc:Choice xmlns:v="urn:schemas-microsoft-com:vml" Requires="v">
-                <p:oleObj spid="_x0000_s1046" name="Equation" r:id="rId4" imgW="1536700" imgH="457200" progId="Equation.DSMT4">
+                <p:oleObj spid="_x0000_s1056" name="Equation" r:id="rId4" imgW="1536700" imgH="457200" progId="Equation.DSMT4">
                   <p:embed/>
                 </p:oleObj>
               </mc:Choice>
@@ -6167,7 +6673,7 @@
                     </p:blipFill>
                     <p:spPr>
                       <a:xfrm>
-                        <a:off x="1676400" y="4648200"/>
+                        <a:off x="1756832" y="4343400"/>
                         <a:ext cx="5634568" cy="1676400"/>
                       </a:xfrm>
                       <a:prstGeom prst="rect">
@@ -6208,6 +6714,72 @@
           </a:p>
         </p:txBody>
       </p:sp>
+      <p:graphicFrame>
+        <p:nvGraphicFramePr>
+          <p:cNvPr id="21" name="Object 16"/>
+          <p:cNvGraphicFramePr>
+            <a:graphicFrameLocks noChangeAspect="1"/>
+          </p:cNvGraphicFramePr>
+          <p:nvPr>
+            <p:extLst>
+              <p:ext uri="{D42A27DB-BD31-4B8C-83A1-F6EECF244321}">
+                <p14:modId xmlns:p14="http://schemas.microsoft.com/office/powerpoint/2010/main" val="4017734195"/>
+              </p:ext>
+            </p:extLst>
+          </p:nvPr>
+        </p:nvGraphicFramePr>
+        <p:xfrm>
+          <a:off x="1981200" y="5181600"/>
+          <a:ext cx="3262312" cy="1676400"/>
+        </p:xfrm>
+        <a:graphic>
+          <a:graphicData uri="http://schemas.openxmlformats.org/presentationml/2006/ole">
+            <mc:AlternateContent xmlns:mc="http://schemas.openxmlformats.org/markup-compatibility/2006">
+              <mc:Choice xmlns:v="urn:schemas-microsoft-com:vml" Requires="v">
+                <p:oleObj spid="_x0000_s1057" name="Equation" r:id="rId6" imgW="965200" imgH="495300" progId="Equation.DSMT4">
+                  <p:embed/>
+                </p:oleObj>
+              </mc:Choice>
+              <mc:Fallback>
+                <p:oleObj name="Equation" r:id="rId6" imgW="965200" imgH="495300" progId="Equation.DSMT4">
+                  <p:embed/>
+                  <p:pic>
+                    <p:nvPicPr>
+                      <p:cNvPr id="0" name=""/>
+                      <p:cNvPicPr>
+                        <a:picLocks noChangeAspect="1" noChangeArrowheads="1"/>
+                      </p:cNvPicPr>
+                      <p:nvPr/>
+                    </p:nvPicPr>
+                    <p:blipFill>
+                      <a:blip r:embed="rId7"/>
+                      <a:srcRect/>
+                      <a:stretch>
+                        <a:fillRect/>
+                      </a:stretch>
+                    </p:blipFill>
+                    <p:spPr bwMode="auto">
+                      <a:xfrm>
+                        <a:off x="1981200" y="5181600"/>
+                        <a:ext cx="3262312" cy="1676400"/>
+                      </a:xfrm>
+                      <a:prstGeom prst="rect">
+                        <a:avLst/>
+                      </a:prstGeom>
+                      <a:noFill/>
+                      <a:ln>
+                        <a:noFill/>
+                      </a:ln>
+                      <a:effectLst/>
+                      <a:extLst/>
+                    </p:spPr>
+                  </p:pic>
+                </p:oleObj>
+              </mc:Fallback>
+            </mc:AlternateContent>
+          </a:graphicData>
+        </a:graphic>
+      </p:graphicFrame>
     </p:spTree>
     <p:extLst>
       <p:ext uri="{BB962C8B-B14F-4D97-AF65-F5344CB8AC3E}">
@@ -6218,18 +6790,9 @@
   <p:clrMapOvr>
     <a:masterClrMapping/>
   </p:clrMapOvr>
-  <mc:AlternateContent xmlns:mc="http://schemas.openxmlformats.org/markup-compatibility/2006" xmlns:p14="http://schemas.microsoft.com/office/powerpoint/2010/main">
-    <mc:Choice Requires="p14">
-      <p:transition spd="med" p14:dur="700">
-        <p:fade/>
-      </p:transition>
-    </mc:Choice>
-    <mc:Fallback xmlns="">
-      <p:transition xmlns:p14="http://schemas.microsoft.com/office/powerpoint/2010/main" spd="med">
-        <p:fade/>
-      </p:transition>
-    </mc:Fallback>
-  </mc:AlternateContent>
+  <p:transition xmlns:p14="http://schemas.microsoft.com/office/powerpoint/2010/main" spd="slow" advClick="0">
+    <p:fade/>
+  </p:transition>
   <p:timing>
     <p:tnLst>
       <p:par>
@@ -6397,21 +6960,30 @@
                             </p:childTnLst>
                           </p:cTn>
                         </p:par>
+                      </p:childTnLst>
+                    </p:cTn>
+                  </p:par>
+                  <p:par>
+                    <p:cTn id="18" fill="hold">
+                      <p:stCondLst>
+                        <p:cond delay="indefinite"/>
+                      </p:stCondLst>
+                      <p:childTnLst>
                         <p:par>
-                          <p:cTn id="18" fill="hold">
+                          <p:cTn id="19" fill="hold">
                             <p:stCondLst>
-                              <p:cond delay="1000"/>
+                              <p:cond delay="0"/>
                             </p:stCondLst>
                             <p:childTnLst>
                               <p:par>
-                                <p:cTn id="19" presetID="9" presetClass="entr" presetSubtype="0" fill="hold" grpId="0" nodeType="afterEffect">
+                                <p:cTn id="20" presetID="10" presetClass="entr" presetSubtype="0" fill="hold" grpId="0" nodeType="clickEffect">
                                   <p:stCondLst>
                                     <p:cond delay="0"/>
                                   </p:stCondLst>
                                   <p:childTnLst>
                                     <p:set>
                                       <p:cBhvr>
-                                        <p:cTn id="20" dur="1" fill="hold">
+                                        <p:cTn id="21" dur="1" fill="hold">
                                           <p:stCondLst>
                                             <p:cond delay="0"/>
                                           </p:stCondLst>
@@ -6427,9 +6999,9 @@
                                         <p:strVal val="visible"/>
                                       </p:to>
                                     </p:set>
-                                    <p:animEffect transition="in" filter="dissolve">
+                                    <p:animEffect transition="in" filter="fade">
                                       <p:cBhvr>
-                                        <p:cTn id="21" dur="1000"/>
+                                        <p:cTn id="22" dur="500"/>
                                         <p:tgtEl>
                                           <p:spTgt spid="13"/>
                                         </p:tgtEl>
@@ -6445,26 +7017,26 @@
                     </p:cTn>
                   </p:par>
                   <p:par>
-                    <p:cTn id="22" fill="hold">
+                    <p:cTn id="23" fill="hold">
                       <p:stCondLst>
                         <p:cond delay="indefinite"/>
                       </p:stCondLst>
                       <p:childTnLst>
                         <p:par>
-                          <p:cTn id="23" fill="hold">
+                          <p:cTn id="24" fill="hold">
                             <p:stCondLst>
                               <p:cond delay="0"/>
                             </p:stCondLst>
                             <p:childTnLst>
                               <p:par>
-                                <p:cTn id="24" presetID="9" presetClass="entr" presetSubtype="0" fill="hold" grpId="0" nodeType="clickEffect">
+                                <p:cTn id="25" presetID="10" presetClass="entr" presetSubtype="0" fill="hold" grpId="0" nodeType="clickEffect">
                                   <p:stCondLst>
                                     <p:cond delay="0"/>
                                   </p:stCondLst>
                                   <p:childTnLst>
                                     <p:set>
                                       <p:cBhvr>
-                                        <p:cTn id="25" dur="1" fill="hold">
+                                        <p:cTn id="26" dur="1" fill="hold">
                                           <p:stCondLst>
                                             <p:cond delay="0"/>
                                           </p:stCondLst>
@@ -6480,9 +7052,9 @@
                                         <p:strVal val="visible"/>
                                       </p:to>
                                     </p:set>
-                                    <p:animEffect transition="in" filter="dissolve">
+                                    <p:animEffect transition="in" filter="fade">
                                       <p:cBhvr>
-                                        <p:cTn id="26" dur="500"/>
+                                        <p:cTn id="27" dur="500"/>
                                         <p:tgtEl>
                                           <p:spTgt spid="18"/>
                                         </p:tgtEl>
@@ -6495,20 +7067,20 @@
                           </p:cTn>
                         </p:par>
                         <p:par>
-                          <p:cTn id="27" fill="hold">
+                          <p:cTn id="28" fill="hold">
                             <p:stCondLst>
                               <p:cond delay="500"/>
                             </p:stCondLst>
                             <p:childTnLst>
                               <p:par>
-                                <p:cTn id="28" presetID="22" presetClass="entr" presetSubtype="2" fill="hold" grpId="0" nodeType="afterEffect">
+                                <p:cTn id="29" presetID="22" presetClass="entr" presetSubtype="2" fill="hold" grpId="0" nodeType="afterEffect">
                                   <p:stCondLst>
                                     <p:cond delay="0"/>
                                   </p:stCondLst>
                                   <p:childTnLst>
                                     <p:set>
                                       <p:cBhvr>
-                                        <p:cTn id="29" dur="1" fill="hold">
+                                        <p:cTn id="30" dur="1" fill="hold">
                                           <p:stCondLst>
                                             <p:cond delay="0"/>
                                           </p:stCondLst>
@@ -6526,7 +7098,7 @@
                                     </p:set>
                                     <p:animEffect transition="in" filter="wipe(right)">
                                       <p:cBhvr>
-                                        <p:cTn id="30" dur="1000"/>
+                                        <p:cTn id="31" dur="1000"/>
                                         <p:tgtEl>
                                           <p:spTgt spid="17"/>
                                         </p:tgtEl>
@@ -6539,20 +7111,20 @@
                           </p:cTn>
                         </p:par>
                         <p:par>
-                          <p:cTn id="31" fill="hold">
+                          <p:cTn id="32" fill="hold">
                             <p:stCondLst>
                               <p:cond delay="1500"/>
                             </p:stCondLst>
                             <p:childTnLst>
                               <p:par>
-                                <p:cTn id="32" presetID="22" presetClass="entr" presetSubtype="2" fill="hold" grpId="0" nodeType="afterEffect">
+                                <p:cTn id="33" presetID="22" presetClass="entr" presetSubtype="2" fill="hold" grpId="0" nodeType="afterEffect">
                                   <p:stCondLst>
                                     <p:cond delay="0"/>
                                   </p:stCondLst>
                                   <p:childTnLst>
                                     <p:set>
                                       <p:cBhvr>
-                                        <p:cTn id="33" dur="1" fill="hold">
+                                        <p:cTn id="34" dur="1" fill="hold">
                                           <p:stCondLst>
                                             <p:cond delay="0"/>
                                           </p:stCondLst>
@@ -6570,7 +7142,7 @@
                                     </p:set>
                                     <p:animEffect transition="in" filter="wipe(right)">
                                       <p:cBhvr>
-                                        <p:cTn id="34" dur="1000"/>
+                                        <p:cTn id="35" dur="1000"/>
                                         <p:tgtEl>
                                           <p:spTgt spid="16"/>
                                         </p:tgtEl>
@@ -6586,26 +7158,26 @@
                     </p:cTn>
                   </p:par>
                   <p:par>
-                    <p:cTn id="35" fill="hold">
+                    <p:cTn id="36" fill="hold">
                       <p:stCondLst>
                         <p:cond delay="indefinite"/>
                       </p:stCondLst>
                       <p:childTnLst>
                         <p:par>
-                          <p:cTn id="36" fill="hold">
+                          <p:cTn id="37" fill="hold">
                             <p:stCondLst>
                               <p:cond delay="0"/>
                             </p:stCondLst>
                             <p:childTnLst>
                               <p:par>
-                                <p:cTn id="37" presetID="9" presetClass="entr" presetSubtype="0" fill="hold" nodeType="clickEffect">
+                                <p:cTn id="38" presetID="10" presetClass="entr" presetSubtype="0" fill="hold" nodeType="clickEffect">
                                   <p:stCondLst>
                                     <p:cond delay="0"/>
                                   </p:stCondLst>
                                   <p:childTnLst>
                                     <p:set>
                                       <p:cBhvr>
-                                        <p:cTn id="38" dur="1" fill="hold">
+                                        <p:cTn id="39" dur="1" fill="hold">
                                           <p:stCondLst>
                                             <p:cond delay="0"/>
                                           </p:stCondLst>
@@ -6621,9 +7193,9 @@
                                         <p:strVal val="visible"/>
                                       </p:to>
                                     </p:set>
-                                    <p:animEffect transition="in" filter="dissolve">
+                                    <p:animEffect transition="in" filter="fade">
                                       <p:cBhvr>
-                                        <p:cTn id="39" dur="500"/>
+                                        <p:cTn id="40" dur="500"/>
                                         <p:tgtEl>
                                           <p:spTgt spid="6"/>
                                         </p:tgtEl>
@@ -6636,20 +7208,20 @@
                           </p:cTn>
                         </p:par>
                         <p:par>
-                          <p:cTn id="40" fill="hold">
+                          <p:cTn id="41" fill="hold">
                             <p:stCondLst>
                               <p:cond delay="500"/>
                             </p:stCondLst>
                             <p:childTnLst>
                               <p:par>
-                                <p:cTn id="41" presetID="9" presetClass="entr" presetSubtype="0" fill="hold" grpId="0" nodeType="afterEffect">
+                                <p:cTn id="42" presetID="9" presetClass="entr" presetSubtype="0" fill="hold" grpId="0" nodeType="afterEffect">
                                   <p:stCondLst>
                                     <p:cond delay="0"/>
                                   </p:stCondLst>
                                   <p:childTnLst>
                                     <p:set>
                                       <p:cBhvr>
-                                        <p:cTn id="42" dur="1" fill="hold">
+                                        <p:cTn id="43" dur="1" fill="hold">
                                           <p:stCondLst>
                                             <p:cond delay="0"/>
                                           </p:stCondLst>
@@ -6667,7 +7239,7 @@
                                     </p:set>
                                     <p:animEffect transition="in" filter="dissolve">
                                       <p:cBhvr>
-                                        <p:cTn id="43" dur="500"/>
+                                        <p:cTn id="44" dur="500"/>
                                         <p:tgtEl>
                                           <p:spTgt spid="14"/>
                                         </p:tgtEl>
@@ -6683,26 +7255,26 @@
                     </p:cTn>
                   </p:par>
                   <p:par>
-                    <p:cTn id="44" fill="hold">
+                    <p:cTn id="45" fill="hold">
                       <p:stCondLst>
                         <p:cond delay="indefinite"/>
                       </p:stCondLst>
                       <p:childTnLst>
                         <p:par>
-                          <p:cTn id="45" fill="hold">
+                          <p:cTn id="46" fill="hold">
                             <p:stCondLst>
                               <p:cond delay="0"/>
                             </p:stCondLst>
                             <p:childTnLst>
                               <p:par>
-                                <p:cTn id="46" presetID="22" presetClass="entr" presetSubtype="1" fill="hold" grpId="0" nodeType="clickEffect">
+                                <p:cTn id="47" presetID="22" presetClass="entr" presetSubtype="1" fill="hold" grpId="0" nodeType="clickEffect">
                                   <p:stCondLst>
                                     <p:cond delay="0"/>
                                   </p:stCondLst>
                                   <p:childTnLst>
                                     <p:set>
                                       <p:cBhvr>
-                                        <p:cTn id="47" dur="1" fill="hold">
+                                        <p:cTn id="48" dur="1" fill="hold">
                                           <p:stCondLst>
                                             <p:cond delay="0"/>
                                           </p:stCondLst>
@@ -6720,7 +7292,7 @@
                                     </p:set>
                                     <p:animEffect transition="in" filter="wipe(up)">
                                       <p:cBhvr>
-                                        <p:cTn id="48" dur="1000"/>
+                                        <p:cTn id="49" dur="1000"/>
                                         <p:tgtEl>
                                           <p:spTgt spid="15"/>
                                         </p:tgtEl>
@@ -6736,26 +7308,26 @@
                     </p:cTn>
                   </p:par>
                   <p:par>
-                    <p:cTn id="49" fill="hold">
+                    <p:cTn id="50" fill="hold">
                       <p:stCondLst>
                         <p:cond delay="indefinite"/>
                       </p:stCondLst>
                       <p:childTnLst>
                         <p:par>
-                          <p:cTn id="50" fill="hold">
+                          <p:cTn id="51" fill="hold">
                             <p:stCondLst>
                               <p:cond delay="0"/>
                             </p:stCondLst>
                             <p:childTnLst>
                               <p:par>
-                                <p:cTn id="51" presetID="22" presetClass="entr" presetSubtype="8" fill="hold" nodeType="clickEffect">
+                                <p:cTn id="52" presetID="22" presetClass="entr" presetSubtype="8" fill="hold" nodeType="clickEffect">
                                   <p:stCondLst>
                                     <p:cond delay="0"/>
                                   </p:stCondLst>
                                   <p:childTnLst>
                                     <p:set>
                                       <p:cBhvr>
-                                        <p:cTn id="52" dur="1" fill="hold">
+                                        <p:cTn id="53" dur="1" fill="hold">
                                           <p:stCondLst>
                                             <p:cond delay="0"/>
                                           </p:stCondLst>
@@ -6773,9 +7345,62 @@
                                     </p:set>
                                     <p:animEffect transition="in" filter="wipe(left)">
                                       <p:cBhvr>
-                                        <p:cTn id="53" dur="1000"/>
+                                        <p:cTn id="54" dur="1000"/>
                                         <p:tgtEl>
                                           <p:spTgt spid="19"/>
+                                        </p:tgtEl>
+                                      </p:cBhvr>
+                                    </p:animEffect>
+                                  </p:childTnLst>
+                                </p:cTn>
+                              </p:par>
+                            </p:childTnLst>
+                          </p:cTn>
+                        </p:par>
+                      </p:childTnLst>
+                    </p:cTn>
+                  </p:par>
+                  <p:par>
+                    <p:cTn id="55" fill="hold">
+                      <p:stCondLst>
+                        <p:cond delay="indefinite"/>
+                      </p:stCondLst>
+                      <p:childTnLst>
+                        <p:par>
+                          <p:cTn id="56" fill="hold">
+                            <p:stCondLst>
+                              <p:cond delay="0"/>
+                            </p:stCondLst>
+                            <p:childTnLst>
+                              <p:par>
+                                <p:cTn id="57" presetID="22" presetClass="entr" presetSubtype="4" fill="hold" nodeType="clickEffect">
+                                  <p:stCondLst>
+                                    <p:cond delay="0"/>
+                                  </p:stCondLst>
+                                  <p:childTnLst>
+                                    <p:set>
+                                      <p:cBhvr>
+                                        <p:cTn id="58" dur="1" fill="hold">
+                                          <p:stCondLst>
+                                            <p:cond delay="0"/>
+                                          </p:stCondLst>
+                                        </p:cTn>
+                                        <p:tgtEl>
+                                          <p:spTgt spid="21"/>
+                                        </p:tgtEl>
+                                        <p:attrNameLst>
+                                          <p:attrName>style.visibility</p:attrName>
+                                        </p:attrNameLst>
+                                      </p:cBhvr>
+                                      <p:to>
+                                        <p:strVal val="visible"/>
+                                      </p:to>
+                                    </p:set>
+                                    <p:animEffect transition="in" filter="wipe(down)">
+                                      <p:cBhvr>
+                                        <p:cTn id="59" dur="500"/>
+                                        <p:tgtEl>
+                                          <p:spTgt spid="21"/>
                                         </p:tgtEl>
                                       </p:cBhvr>
                                     </p:animEffect>
@@ -6825,7 +7450,1249 @@
 </file>
 
 <file path=ppt/slides/slide8.xml><?xml version="1.0" encoding="utf-8"?>
-<p:sld xmlns:a="http://schemas.openxmlformats.org/drawingml/2006/main" xmlns:r="http://schemas.openxmlformats.org/officeDocument/2006/relationships" xmlns:p="http://schemas.openxmlformats.org/presentationml/2006/main">
+<p:sld xmlns:a="http://schemas.openxmlformats.org/drawingml/2006/main" xmlns:r="http://schemas.openxmlformats.org/officeDocument/2006/relationships" xmlns:p="http://schemas.openxmlformats.org/presentationml/2006/main" show="0">
+  <p:cSld>
+    <p:spTree>
+      <p:nvGrpSpPr>
+        <p:cNvPr id="1" name=""/>
+        <p:cNvGrpSpPr/>
+        <p:nvPr/>
+      </p:nvGrpSpPr>
+      <p:grpSpPr>
+        <a:xfrm>
+          <a:off x="0" y="0"/>
+          <a:ext cx="0" cy="0"/>
+          <a:chOff x="0" y="0"/>
+          <a:chExt cx="0" cy="0"/>
+        </a:xfrm>
+      </p:grpSpPr>
+      <p:sp>
+        <p:nvSpPr>
+          <p:cNvPr id="4099" name="Text Box 3"/>
+          <p:cNvSpPr txBox="1">
+            <a:spLocks noChangeArrowheads="1"/>
+          </p:cNvSpPr>
+          <p:nvPr/>
+        </p:nvSpPr>
+        <p:spPr bwMode="auto">
+          <a:xfrm>
+            <a:off x="228600" y="990600"/>
+            <a:ext cx="8839200" cy="707886"/>
+          </a:xfrm>
+          <a:prstGeom prst="rect">
+            <a:avLst/>
+          </a:prstGeom>
+          <a:noFill/>
+          <a:ln>
+            <a:noFill/>
+          </a:ln>
+          <a:effectLst/>
+          <a:extLst>
+            <a:ext uri="{909E8E84-426E-40dd-AFC4-6F175D3DCCD1}">
+              <a14:hiddenFill xmlns:a14="http://schemas.microsoft.com/office/drawing/2010/main">
+                <a:solidFill>
+                  <a:schemeClr val="accent1"/>
+                </a:solidFill>
+              </a14:hiddenFill>
+            </a:ext>
+            <a:ext uri="{91240B29-F687-4f45-9708-019B960494DF}">
+              <a14:hiddenLine xmlns:a14="http://schemas.microsoft.com/office/drawing/2010/main" w="9525">
+                <a:solidFill>
+                  <a:schemeClr val="tx1"/>
+                </a:solidFill>
+                <a:miter lim="800000"/>
+                <a:headEnd/>
+                <a:tailEnd type="none" w="lg" len="lg"/>
+              </a14:hiddenLine>
+            </a:ext>
+            <a:ext uri="{AF507438-7753-43e0-B8FC-AC1667EBCBE1}">
+              <a14:hiddenEffects xmlns:a14="http://schemas.microsoft.com/office/drawing/2010/main">
+                <a:effectLst>
+                  <a:outerShdw blurRad="63500" dist="38099" dir="2700000" algn="ctr" rotWithShape="0">
+                    <a:schemeClr val="bg2">
+                      <a:alpha val="74998"/>
+                    </a:schemeClr>
+                  </a:outerShdw>
+                </a:effectLst>
+              </a14:hiddenEffects>
+            </a:ext>
+          </a:extLst>
+        </p:spPr>
+        <p:txBody>
+          <a:bodyPr wrap="square">
+            <a:spAutoFit/>
+          </a:bodyPr>
+          <a:lstStyle/>
+          <a:p>
+            <a:pPr eaLnBrk="1" hangingPunct="1"/>
+            <a:r>
+              <a:rPr lang="en-US" sz="4000" dirty="0" smtClean="0">
+                <a:latin typeface="Comic Sans MS" charset="0"/>
+              </a:rPr>
+              <a:t>89 + (89+13) +      ⋯       +(89+29･</a:t>
+            </a:r>
+            <a:r>
+              <a:rPr lang="en-US" sz="4000" dirty="0">
+                <a:latin typeface="Comic Sans MS" charset="0"/>
+              </a:rPr>
+              <a:t>13)</a:t>
+            </a:r>
+          </a:p>
+        </p:txBody>
+      </p:sp>
+      <p:cxnSp>
+        <p:nvCxnSpPr>
+          <p:cNvPr id="6" name="Straight Connector 5"/>
+          <p:cNvCxnSpPr/>
+          <p:nvPr/>
+        </p:nvCxnSpPr>
+        <p:spPr bwMode="auto">
+          <a:xfrm>
+            <a:off x="228600" y="3733800"/>
+            <a:ext cx="8534400" cy="0"/>
+          </a:xfrm>
+          <a:prstGeom prst="line">
+            <a:avLst/>
+          </a:prstGeom>
+          <a:solidFill>
+            <a:schemeClr val="accent1"/>
+          </a:solidFill>
+          <a:ln w="41275" cap="flat" cmpd="sng" algn="ctr">
+            <a:solidFill>
+              <a:schemeClr val="tx1"/>
+            </a:solidFill>
+            <a:prstDash val="solid"/>
+            <a:round/>
+            <a:headEnd type="none" w="med" len="med"/>
+            <a:tailEnd type="none" w="med" len="med"/>
+          </a:ln>
+          <a:effectLst/>
+          <a:extLst>
+            <a:ext uri="{AF507438-7753-43e0-B8FC-AC1667EBCBE1}">
+              <a14:hiddenEffects xmlns:a14="http://schemas.microsoft.com/office/drawing/2010/main">
+                <a:effectLst>
+                  <a:outerShdw blurRad="63500" dist="38099" dir="2700000" algn="ctr" rotWithShape="0">
+                    <a:schemeClr val="bg2">
+                      <a:alpha val="74998"/>
+                    </a:schemeClr>
+                  </a:outerShdw>
+                </a:effectLst>
+              </a14:hiddenEffects>
+            </a:ext>
+          </a:extLst>
+        </p:spPr>
+      </p:cxnSp>
+      <p:sp>
+        <p:nvSpPr>
+          <p:cNvPr id="11" name="TextBox 10"/>
+          <p:cNvSpPr txBox="1"/>
+          <p:nvPr/>
+        </p:nvSpPr>
+        <p:spPr>
+          <a:xfrm>
+            <a:off x="381000" y="1752600"/>
+            <a:ext cx="7163765" cy="769441"/>
+          </a:xfrm>
+          <a:prstGeom prst="rect">
+            <a:avLst/>
+          </a:prstGeom>
+          <a:noFill/>
+        </p:spPr>
+        <p:txBody>
+          <a:bodyPr wrap="none" rtlCol="0">
+            <a:spAutoFit/>
+          </a:bodyPr>
+          <a:lstStyle/>
+          <a:p>
+            <a:r>
+              <a:rPr lang="en-US" sz="4400" dirty="0">
+                <a:solidFill>
+                  <a:srgbClr val="0000FF"/>
+                </a:solidFill>
+                <a:latin typeface="Comic Sans MS" charset="0"/>
+              </a:rPr>
+              <a:t>F </a:t>
+            </a:r>
+            <a:r>
+              <a:rPr lang="en-US" sz="4400" dirty="0" smtClean="0">
+                <a:solidFill>
+                  <a:srgbClr val="0000FF"/>
+                </a:solidFill>
+                <a:latin typeface="Comic Sans MS" charset="0"/>
+              </a:rPr>
+              <a:t>  +   (</a:t>
+            </a:r>
+            <a:r>
+              <a:rPr lang="en-US" sz="4400" dirty="0" err="1">
+                <a:solidFill>
+                  <a:srgbClr val="0000FF"/>
+                </a:solidFill>
+                <a:latin typeface="Comic Sans MS" charset="0"/>
+              </a:rPr>
+              <a:t>F+d</a:t>
+            </a:r>
+            <a:r>
+              <a:rPr lang="en-US" sz="4400" dirty="0" smtClean="0">
+                <a:solidFill>
+                  <a:srgbClr val="0000FF"/>
+                </a:solidFill>
+                <a:latin typeface="Comic Sans MS" charset="0"/>
+              </a:rPr>
+              <a:t>) +   </a:t>
+            </a:r>
+            <a:r>
+              <a:rPr lang="en-US" sz="4400" dirty="0" smtClean="0">
+                <a:solidFill>
+                  <a:srgbClr val="0000FF"/>
+                </a:solidFill>
+                <a:latin typeface="Comic Sans MS" charset="0"/>
+              </a:rPr>
+              <a:t>⋯   + (</a:t>
+            </a:r>
+            <a:r>
+              <a:rPr lang="en-US" sz="4400" dirty="0" err="1" smtClean="0">
+                <a:solidFill>
+                  <a:srgbClr val="0000FF"/>
+                </a:solidFill>
+                <a:latin typeface="Comic Sans MS" charset="0"/>
+              </a:rPr>
+              <a:t>F+nd</a:t>
+            </a:r>
+            <a:r>
+              <a:rPr lang="en-US" sz="4400" dirty="0" smtClean="0">
+                <a:solidFill>
+                  <a:srgbClr val="0000FF"/>
+                </a:solidFill>
+                <a:latin typeface="Comic Sans MS" charset="0"/>
+              </a:rPr>
+              <a:t>)</a:t>
+            </a:r>
+            <a:endParaRPr lang="en-US" sz="4400" dirty="0"/>
+          </a:p>
+        </p:txBody>
+      </p:sp>
+      <p:sp>
+        <p:nvSpPr>
+          <p:cNvPr id="13" name="TextBox 12"/>
+          <p:cNvSpPr txBox="1"/>
+          <p:nvPr/>
+        </p:nvSpPr>
+        <p:spPr>
+          <a:xfrm>
+            <a:off x="7543800" y="1676400"/>
+            <a:ext cx="1373167" cy="923330"/>
+          </a:xfrm>
+          <a:prstGeom prst="rect">
+            <a:avLst/>
+          </a:prstGeom>
+          <a:noFill/>
+        </p:spPr>
+        <p:txBody>
+          <a:bodyPr wrap="none" rtlCol="0">
+            <a:spAutoFit/>
+          </a:bodyPr>
+          <a:lstStyle/>
+          <a:p>
+            <a:r>
+              <a:rPr lang="en-US" sz="4800" dirty="0" smtClean="0">
+                <a:latin typeface="Comic Sans MS"/>
+                <a:cs typeface="Comic Sans MS"/>
+              </a:rPr>
+              <a:t>=::</a:t>
+            </a:r>
+            <a:r>
+              <a:rPr lang="en-US" sz="5400" dirty="0" smtClean="0">
+                <a:solidFill>
+                  <a:srgbClr val="9D007C"/>
+                </a:solidFill>
+                <a:latin typeface="Comic Sans MS"/>
+                <a:cs typeface="Comic Sans MS"/>
+              </a:rPr>
+              <a:t>A</a:t>
+            </a:r>
+            <a:endParaRPr lang="en-US" dirty="0">
+              <a:solidFill>
+                <a:srgbClr val="9D007C"/>
+              </a:solidFill>
+            </a:endParaRPr>
+          </a:p>
+        </p:txBody>
+      </p:sp>
+      <p:sp>
+        <p:nvSpPr>
+          <p:cNvPr id="17" name="TextBox 16"/>
+          <p:cNvSpPr txBox="1"/>
+          <p:nvPr/>
+        </p:nvSpPr>
+        <p:spPr>
+          <a:xfrm>
+            <a:off x="152400" y="2819400"/>
+            <a:ext cx="6169427" cy="769441"/>
+          </a:xfrm>
+          <a:prstGeom prst="rect">
+            <a:avLst/>
+          </a:prstGeom>
+          <a:noFill/>
+        </p:spPr>
+        <p:txBody>
+          <a:bodyPr wrap="none" rtlCol="0">
+            <a:spAutoFit/>
+          </a:bodyPr>
+          <a:lstStyle/>
+          <a:p>
+            <a:r>
+              <a:rPr lang="en-US" sz="4400" dirty="0" smtClean="0">
+                <a:solidFill>
+                  <a:srgbClr val="0000FF"/>
+                </a:solidFill>
+                <a:latin typeface="Comic Sans MS" charset="0"/>
+              </a:rPr>
+              <a:t>(</a:t>
+            </a:r>
+            <a:r>
+              <a:rPr lang="en-US" sz="4400" dirty="0" err="1">
+                <a:solidFill>
+                  <a:srgbClr val="0000FF"/>
+                </a:solidFill>
+                <a:latin typeface="Comic Sans MS" charset="0"/>
+              </a:rPr>
+              <a:t>F</a:t>
+            </a:r>
+            <a:r>
+              <a:rPr lang="en-US" sz="4400" dirty="0" err="1" smtClean="0">
+                <a:solidFill>
+                  <a:srgbClr val="0000FF"/>
+                </a:solidFill>
+                <a:latin typeface="Comic Sans MS" charset="0"/>
+              </a:rPr>
+              <a:t>+nd</a:t>
+            </a:r>
+            <a:r>
+              <a:rPr lang="en-US" sz="4400" dirty="0" smtClean="0">
+                <a:solidFill>
+                  <a:srgbClr val="0000FF"/>
+                </a:solidFill>
+                <a:latin typeface="Comic Sans MS" charset="0"/>
+              </a:rPr>
+              <a:t>)+(F+(n-1)d</a:t>
+            </a:r>
+            <a:r>
+              <a:rPr lang="en-US" sz="4400" dirty="0" smtClean="0">
+                <a:solidFill>
+                  <a:srgbClr val="0000FF"/>
+                </a:solidFill>
+                <a:latin typeface="Comic Sans MS" charset="0"/>
+              </a:rPr>
+              <a:t>) +⋯+ F</a:t>
+            </a:r>
+            <a:endParaRPr lang="en-US" sz="4400" dirty="0"/>
+          </a:p>
+        </p:txBody>
+      </p:sp>
+      <p:sp>
+        <p:nvSpPr>
+          <p:cNvPr id="18" name="TextBox 17"/>
+          <p:cNvSpPr txBox="1"/>
+          <p:nvPr/>
+        </p:nvSpPr>
+        <p:spPr>
+          <a:xfrm>
+            <a:off x="7543800" y="2743200"/>
+            <a:ext cx="1373167" cy="923330"/>
+          </a:xfrm>
+          <a:prstGeom prst="rect">
+            <a:avLst/>
+          </a:prstGeom>
+          <a:noFill/>
+        </p:spPr>
+        <p:txBody>
+          <a:bodyPr wrap="none" rtlCol="0">
+            <a:spAutoFit/>
+          </a:bodyPr>
+          <a:lstStyle/>
+          <a:p>
+            <a:r>
+              <a:rPr lang="en-US" sz="4800" dirty="0" smtClean="0">
+                <a:latin typeface="Comic Sans MS"/>
+                <a:cs typeface="Comic Sans MS"/>
+              </a:rPr>
+              <a:t>=</a:t>
+            </a:r>
+            <a:r>
+              <a:rPr lang="en-US" sz="4800" dirty="0">
+                <a:latin typeface="Comic Sans MS"/>
+                <a:cs typeface="Comic Sans MS"/>
+              </a:rPr>
+              <a:t> </a:t>
+            </a:r>
+            <a:r>
+              <a:rPr lang="en-US" sz="4800" dirty="0" smtClean="0">
+                <a:latin typeface="Comic Sans MS"/>
+                <a:cs typeface="Comic Sans MS"/>
+              </a:rPr>
+              <a:t> </a:t>
+            </a:r>
+            <a:r>
+              <a:rPr lang="en-US" sz="5400" dirty="0" smtClean="0">
+                <a:solidFill>
+                  <a:srgbClr val="9D007C"/>
+                </a:solidFill>
+                <a:latin typeface="Comic Sans MS"/>
+                <a:cs typeface="Comic Sans MS"/>
+              </a:rPr>
+              <a:t>A</a:t>
+            </a:r>
+            <a:endParaRPr lang="en-US" dirty="0">
+              <a:solidFill>
+                <a:srgbClr val="9D007C"/>
+              </a:solidFill>
+            </a:endParaRPr>
+          </a:p>
+        </p:txBody>
+      </p:sp>
+      <p:sp>
+        <p:nvSpPr>
+          <p:cNvPr id="14" name="TextBox 13"/>
+          <p:cNvSpPr txBox="1"/>
+          <p:nvPr/>
+        </p:nvSpPr>
+        <p:spPr>
+          <a:xfrm>
+            <a:off x="7642159" y="3741003"/>
+            <a:ext cx="1425641" cy="830997"/>
+          </a:xfrm>
+          <a:prstGeom prst="rect">
+            <a:avLst/>
+          </a:prstGeom>
+          <a:noFill/>
+        </p:spPr>
+        <p:txBody>
+          <a:bodyPr wrap="none" rtlCol="0">
+            <a:spAutoFit/>
+          </a:bodyPr>
+          <a:lstStyle/>
+          <a:p>
+            <a:r>
+              <a:rPr lang="en-US" sz="4000" dirty="0" smtClean="0">
+                <a:latin typeface="Comic Sans MS"/>
+                <a:cs typeface="Comic Sans MS"/>
+              </a:rPr>
+              <a:t>=</a:t>
+            </a:r>
+            <a:r>
+              <a:rPr lang="en-US" sz="4000" dirty="0">
+                <a:latin typeface="Comic Sans MS"/>
+                <a:cs typeface="Comic Sans MS"/>
+              </a:rPr>
+              <a:t> </a:t>
+            </a:r>
+            <a:r>
+              <a:rPr lang="en-US" sz="4800" dirty="0" smtClean="0">
+                <a:solidFill>
+                  <a:srgbClr val="0000FF"/>
+                </a:solidFill>
+                <a:latin typeface="Comic Sans MS"/>
+                <a:cs typeface="Comic Sans MS"/>
+              </a:rPr>
+              <a:t>2</a:t>
+            </a:r>
+            <a:r>
+              <a:rPr lang="en-US" sz="4800" dirty="0" smtClean="0">
+                <a:solidFill>
+                  <a:srgbClr val="9D007C"/>
+                </a:solidFill>
+                <a:latin typeface="Comic Sans MS"/>
+                <a:cs typeface="Comic Sans MS"/>
+              </a:rPr>
+              <a:t>A</a:t>
+            </a:r>
+            <a:endParaRPr lang="en-US" sz="4000" dirty="0"/>
+          </a:p>
+        </p:txBody>
+      </p:sp>
+      <p:sp>
+        <p:nvSpPr>
+          <p:cNvPr id="15" name="Rectangle 14"/>
+          <p:cNvSpPr/>
+          <p:nvPr/>
+        </p:nvSpPr>
+        <p:spPr>
+          <a:xfrm>
+            <a:off x="76200" y="3733800"/>
+            <a:ext cx="7723889" cy="769441"/>
+          </a:xfrm>
+          <a:prstGeom prst="rect">
+            <a:avLst/>
+          </a:prstGeom>
+        </p:spPr>
+        <p:txBody>
+          <a:bodyPr wrap="none">
+            <a:spAutoFit/>
+          </a:bodyPr>
+          <a:lstStyle/>
+          <a:p>
+            <a:r>
+              <a:rPr lang="en-US" sz="4400" dirty="0" smtClean="0">
+                <a:solidFill>
+                  <a:srgbClr val="0000FF"/>
+                </a:solidFill>
+                <a:latin typeface="Comic Sans MS" charset="0"/>
+              </a:rPr>
+              <a:t>(2F+nd)</a:t>
+            </a:r>
+            <a:r>
+              <a:rPr lang="en-US" sz="4400" dirty="0">
+                <a:solidFill>
+                  <a:srgbClr val="0000FF"/>
+                </a:solidFill>
+                <a:latin typeface="Comic Sans MS" charset="0"/>
+              </a:rPr>
+              <a:t>+</a:t>
+            </a:r>
+            <a:r>
+              <a:rPr lang="en-US" sz="4400" dirty="0" smtClean="0">
+                <a:solidFill>
+                  <a:srgbClr val="0000FF"/>
+                </a:solidFill>
+                <a:latin typeface="Comic Sans MS" charset="0"/>
+              </a:rPr>
+              <a:t>(2F+nd)+ </a:t>
+            </a:r>
+            <a:r>
+              <a:rPr lang="en-US" sz="4400" baseline="-25000" dirty="0" smtClean="0">
+                <a:solidFill>
+                  <a:srgbClr val="0000FF"/>
+                </a:solidFill>
+                <a:latin typeface="Comic Sans MS" charset="0"/>
+              </a:rPr>
+              <a:t> </a:t>
+            </a:r>
+            <a:r>
+              <a:rPr lang="en-US" sz="4400" dirty="0" smtClean="0">
+                <a:solidFill>
+                  <a:srgbClr val="0000FF"/>
+                </a:solidFill>
+                <a:latin typeface="Comic Sans MS" charset="0"/>
+              </a:rPr>
+              <a:t>⋯ </a:t>
+            </a:r>
+            <a:r>
+              <a:rPr lang="en-US" sz="4400" dirty="0" smtClean="0">
+                <a:solidFill>
+                  <a:srgbClr val="0000FF"/>
+                </a:solidFill>
+                <a:latin typeface="Comic Sans MS" charset="0"/>
+              </a:rPr>
+              <a:t>+(2F+nd) </a:t>
+            </a:r>
+            <a:endParaRPr lang="en-US" sz="4400" dirty="0"/>
+          </a:p>
+        </p:txBody>
+      </p:sp>
+      <p:graphicFrame>
+        <p:nvGraphicFramePr>
+          <p:cNvPr id="19" name="Object 18"/>
+          <p:cNvGraphicFramePr>
+            <a:graphicFrameLocks noChangeAspect="1"/>
+          </p:cNvGraphicFramePr>
+          <p:nvPr>
+            <p:extLst>
+              <p:ext uri="{D42A27DB-BD31-4B8C-83A1-F6EECF244321}">
+                <p14:modId xmlns:p14="http://schemas.microsoft.com/office/powerpoint/2010/main" val="3393853855"/>
+              </p:ext>
+            </p:extLst>
+          </p:nvPr>
+        </p:nvGraphicFramePr>
+        <p:xfrm>
+          <a:off x="868363" y="4797425"/>
+          <a:ext cx="7408862" cy="758825"/>
+        </p:xfrm>
+        <a:graphic>
+          <a:graphicData uri="http://schemas.openxmlformats.org/presentationml/2006/ole">
+            <mc:AlternateContent xmlns:mc="http://schemas.openxmlformats.org/markup-compatibility/2006">
+              <mc:Choice xmlns:v="urn:schemas-microsoft-com:vml" Requires="v">
+                <p:oleObj spid="_x0000_s97291" name="Equation" r:id="rId4" imgW="2235200" imgH="228600" progId="Equation.DSMT4">
+                  <p:embed/>
+                </p:oleObj>
+              </mc:Choice>
+              <mc:Fallback>
+                <p:oleObj name="Equation" r:id="rId4" imgW="2235200" imgH="228600" progId="Equation.DSMT4">
+                  <p:embed/>
+                  <p:pic>
+                    <p:nvPicPr>
+                      <p:cNvPr id="0" name=""/>
+                      <p:cNvPicPr/>
+                      <p:nvPr/>
+                    </p:nvPicPr>
+                    <p:blipFill>
+                      <a:blip r:embed="rId5"/>
+                      <a:stretch>
+                        <a:fillRect/>
+                      </a:stretch>
+                    </p:blipFill>
+                    <p:spPr>
+                      <a:xfrm>
+                        <a:off x="868363" y="4797425"/>
+                        <a:ext cx="7408862" cy="758825"/>
+                      </a:xfrm>
+                      <a:prstGeom prst="rect">
+                        <a:avLst/>
+                      </a:prstGeom>
+                    </p:spPr>
+                  </p:pic>
+                </p:oleObj>
+              </mc:Fallback>
+            </mc:AlternateContent>
+          </a:graphicData>
+        </a:graphic>
+      </p:graphicFrame>
+      <p:sp>
+        <p:nvSpPr>
+          <p:cNvPr id="20" name="Rectangle 2"/>
+          <p:cNvSpPr>
+            <a:spLocks noGrp="1" noChangeArrowheads="1"/>
+          </p:cNvSpPr>
+          <p:nvPr>
+            <p:ph type="title"/>
+          </p:nvPr>
+        </p:nvSpPr>
+        <p:spPr>
+          <a:xfrm>
+            <a:off x="533400" y="228600"/>
+            <a:ext cx="7772400" cy="1143000"/>
+          </a:xfrm>
+        </p:spPr>
+        <p:txBody>
+          <a:bodyPr/>
+          <a:lstStyle/>
+          <a:p>
+            <a:r>
+              <a:rPr lang="en-US" dirty="0"/>
+              <a:t>Sum for Children</a:t>
+            </a:r>
+          </a:p>
+        </p:txBody>
+      </p:sp>
+      <p:graphicFrame>
+        <p:nvGraphicFramePr>
+          <p:cNvPr id="21" name="Object 16"/>
+          <p:cNvGraphicFramePr>
+            <a:graphicFrameLocks noChangeAspect="1"/>
+          </p:cNvGraphicFramePr>
+          <p:nvPr>
+            <p:extLst>
+              <p:ext uri="{D42A27DB-BD31-4B8C-83A1-F6EECF244321}">
+                <p14:modId xmlns:p14="http://schemas.microsoft.com/office/powerpoint/2010/main" val="2976876722"/>
+              </p:ext>
+            </p:extLst>
+          </p:nvPr>
+        </p:nvGraphicFramePr>
+        <p:xfrm>
+          <a:off x="1976772" y="4724400"/>
+          <a:ext cx="3433428" cy="1676400"/>
+        </p:xfrm>
+        <a:graphic>
+          <a:graphicData uri="http://schemas.openxmlformats.org/presentationml/2006/ole">
+            <mc:AlternateContent xmlns:mc="http://schemas.openxmlformats.org/markup-compatibility/2006">
+              <mc:Choice xmlns:v="urn:schemas-microsoft-com:vml" Requires="v">
+                <p:oleObj spid="_x0000_s97292" name="Equation" r:id="rId6" imgW="1016000" imgH="495300" progId="Equation.DSMT4">
+                  <p:embed/>
+                </p:oleObj>
+              </mc:Choice>
+              <mc:Fallback>
+                <p:oleObj name="Equation" r:id="rId6" imgW="1016000" imgH="495300" progId="Equation.DSMT4">
+                  <p:embed/>
+                  <p:pic>
+                    <p:nvPicPr>
+                      <p:cNvPr id="0" name=""/>
+                      <p:cNvPicPr>
+                        <a:picLocks noChangeAspect="1" noChangeArrowheads="1"/>
+                      </p:cNvPicPr>
+                      <p:nvPr/>
+                    </p:nvPicPr>
+                    <p:blipFill>
+                      <a:blip r:embed="rId7"/>
+                      <a:srcRect/>
+                      <a:stretch>
+                        <a:fillRect/>
+                      </a:stretch>
+                    </p:blipFill>
+                    <p:spPr bwMode="auto">
+                      <a:xfrm>
+                        <a:off x="1976772" y="4724400"/>
+                        <a:ext cx="3433428" cy="1676400"/>
+                      </a:xfrm>
+                      <a:prstGeom prst="rect">
+                        <a:avLst/>
+                      </a:prstGeom>
+                      <a:noFill/>
+                      <a:ln>
+                        <a:noFill/>
+                      </a:ln>
+                      <a:effectLst/>
+                      <a:extLst/>
+                    </p:spPr>
+                  </p:pic>
+                </p:oleObj>
+              </mc:Fallback>
+            </mc:AlternateContent>
+          </a:graphicData>
+        </a:graphic>
+      </p:graphicFrame>
+    </p:spTree>
+    <p:extLst>
+      <p:ext uri="{BB962C8B-B14F-4D97-AF65-F5344CB8AC3E}">
+        <p14:creationId xmlns:p14="http://schemas.microsoft.com/office/powerpoint/2010/main" val="3987934325"/>
+      </p:ext>
+    </p:extLst>
+  </p:cSld>
+  <p:clrMapOvr>
+    <a:masterClrMapping/>
+  </p:clrMapOvr>
+  <p:transition xmlns:p14="http://schemas.microsoft.com/office/powerpoint/2010/main" spd="slow">
+    <p:fade thruBlk="1"/>
+  </p:transition>
+  <p:timing>
+    <p:tnLst>
+      <p:par>
+        <p:cTn xmlns:p14="http://schemas.microsoft.com/office/powerpoint/2010/main" id="1" dur="indefinite" restart="never" nodeType="tmRoot">
+          <p:childTnLst>
+            <p:seq concurrent="1" nextAc="seek">
+              <p:cTn id="2" dur="indefinite" nodeType="mainSeq">
+                <p:childTnLst>
+                  <p:par>
+                    <p:cTn id="3" fill="hold">
+                      <p:stCondLst>
+                        <p:cond delay="indefinite"/>
+                        <p:cond evt="onBegin" delay="0">
+                          <p:tn val="2"/>
+                        </p:cond>
+                      </p:stCondLst>
+                      <p:childTnLst>
+                        <p:par>
+                          <p:cTn id="4" fill="hold">
+                            <p:stCondLst>
+                              <p:cond delay="0"/>
+                            </p:stCondLst>
+                            <p:childTnLst>
+                              <p:par>
+                                <p:cTn id="5" presetID="22" presetClass="entr" presetSubtype="8" fill="hold" grpId="0" nodeType="afterEffect">
+                                  <p:stCondLst>
+                                    <p:cond delay="0"/>
+                                  </p:stCondLst>
+                                  <p:childTnLst>
+                                    <p:set>
+                                      <p:cBhvr>
+                                        <p:cTn id="6" dur="1" fill="hold">
+                                          <p:stCondLst>
+                                            <p:cond delay="0"/>
+                                          </p:stCondLst>
+                                        </p:cTn>
+                                        <p:tgtEl>
+                                          <p:spTgt spid="4099"/>
+                                        </p:tgtEl>
+                                        <p:attrNameLst>
+                                          <p:attrName>style.visibility</p:attrName>
+                                        </p:attrNameLst>
+                                      </p:cBhvr>
+                                      <p:to>
+                                        <p:strVal val="visible"/>
+                                      </p:to>
+                                    </p:set>
+                                    <p:animEffect transition="in" filter="wipe(left)">
+                                      <p:cBhvr>
+                                        <p:cTn id="7" dur="1000"/>
+                                        <p:tgtEl>
+                                          <p:spTgt spid="4099"/>
+                                        </p:tgtEl>
+                                      </p:cBhvr>
+                                    </p:animEffect>
+                                  </p:childTnLst>
+                                </p:cTn>
+                              </p:par>
+                            </p:childTnLst>
+                          </p:cTn>
+                        </p:par>
+                      </p:childTnLst>
+                    </p:cTn>
+                  </p:par>
+                  <p:par>
+                    <p:cTn id="8" fill="hold">
+                      <p:stCondLst>
+                        <p:cond delay="indefinite"/>
+                      </p:stCondLst>
+                      <p:childTnLst>
+                        <p:par>
+                          <p:cTn id="9" fill="hold">
+                            <p:stCondLst>
+                              <p:cond delay="0"/>
+                            </p:stCondLst>
+                            <p:childTnLst>
+                              <p:par>
+                                <p:cTn id="10" presetID="22" presetClass="entr" presetSubtype="8" fill="hold" grpId="0" nodeType="clickEffect">
+                                  <p:stCondLst>
+                                    <p:cond delay="0"/>
+                                  </p:stCondLst>
+                                  <p:childTnLst>
+                                    <p:set>
+                                      <p:cBhvr>
+                                        <p:cTn id="11" dur="1" fill="hold">
+                                          <p:stCondLst>
+                                            <p:cond delay="0"/>
+                                          </p:stCondLst>
+                                        </p:cTn>
+                                        <p:tgtEl>
+                                          <p:spTgt spid="11"/>
+                                        </p:tgtEl>
+                                        <p:attrNameLst>
+                                          <p:attrName>style.visibility</p:attrName>
+                                        </p:attrNameLst>
+                                      </p:cBhvr>
+                                      <p:to>
+                                        <p:strVal val="visible"/>
+                                      </p:to>
+                                    </p:set>
+                                    <p:animEffect transition="in" filter="wipe(left)">
+                                      <p:cBhvr>
+                                        <p:cTn id="12" dur="1000"/>
+                                        <p:tgtEl>
+                                          <p:spTgt spid="11"/>
+                                        </p:tgtEl>
+                                      </p:cBhvr>
+                                    </p:animEffect>
+                                  </p:childTnLst>
+                                </p:cTn>
+                              </p:par>
+                            </p:childTnLst>
+                          </p:cTn>
+                        </p:par>
+                        <p:par>
+                          <p:cTn id="13" fill="hold">
+                            <p:stCondLst>
+                              <p:cond delay="1000"/>
+                            </p:stCondLst>
+                            <p:childTnLst>
+                              <p:par>
+                                <p:cTn id="14" presetID="9" presetClass="entr" presetSubtype="0" fill="hold" grpId="0" nodeType="afterEffect">
+                                  <p:stCondLst>
+                                    <p:cond delay="0"/>
+                                  </p:stCondLst>
+                                  <p:childTnLst>
+                                    <p:set>
+                                      <p:cBhvr>
+                                        <p:cTn id="15" dur="1" fill="hold">
+                                          <p:stCondLst>
+                                            <p:cond delay="0"/>
+                                          </p:stCondLst>
+                                        </p:cTn>
+                                        <p:tgtEl>
+                                          <p:spTgt spid="13"/>
+                                        </p:tgtEl>
+                                        <p:attrNameLst>
+                                          <p:attrName>style.visibility</p:attrName>
+                                        </p:attrNameLst>
+                                      </p:cBhvr>
+                                      <p:to>
+                                        <p:strVal val="visible"/>
+                                      </p:to>
+                                    </p:set>
+                                    <p:animEffect transition="in" filter="dissolve">
+                                      <p:cBhvr>
+                                        <p:cTn id="16" dur="1000"/>
+                                        <p:tgtEl>
+                                          <p:spTgt spid="13"/>
+                                        </p:tgtEl>
+                                      </p:cBhvr>
+                                    </p:animEffect>
+                                  </p:childTnLst>
+                                </p:cTn>
+                              </p:par>
+                            </p:childTnLst>
+                          </p:cTn>
+                        </p:par>
+                      </p:childTnLst>
+                    </p:cTn>
+                  </p:par>
+                  <p:par>
+                    <p:cTn id="17" fill="hold">
+                      <p:stCondLst>
+                        <p:cond delay="indefinite"/>
+                      </p:stCondLst>
+                      <p:childTnLst>
+                        <p:par>
+                          <p:cTn id="18" fill="hold">
+                            <p:stCondLst>
+                              <p:cond delay="0"/>
+                            </p:stCondLst>
+                            <p:childTnLst>
+                              <p:par>
+                                <p:cTn id="19" presetID="9" presetClass="entr" presetSubtype="0" fill="hold" grpId="0" nodeType="clickEffect">
+                                  <p:stCondLst>
+                                    <p:cond delay="0"/>
+                                  </p:stCondLst>
+                                  <p:childTnLst>
+                                    <p:set>
+                                      <p:cBhvr>
+                                        <p:cTn id="20" dur="1" fill="hold">
+                                          <p:stCondLst>
+                                            <p:cond delay="0"/>
+                                          </p:stCondLst>
+                                        </p:cTn>
+                                        <p:tgtEl>
+                                          <p:spTgt spid="18"/>
+                                        </p:tgtEl>
+                                        <p:attrNameLst>
+                                          <p:attrName>style.visibility</p:attrName>
+                                        </p:attrNameLst>
+                                      </p:cBhvr>
+                                      <p:to>
+                                        <p:strVal val="visible"/>
+                                      </p:to>
+                                    </p:set>
+                                    <p:animEffect transition="in" filter="dissolve">
+                                      <p:cBhvr>
+                                        <p:cTn id="21" dur="500"/>
+                                        <p:tgtEl>
+                                          <p:spTgt spid="18"/>
+                                        </p:tgtEl>
+                                      </p:cBhvr>
+                                    </p:animEffect>
+                                  </p:childTnLst>
+                                </p:cTn>
+                              </p:par>
+                            </p:childTnLst>
+                          </p:cTn>
+                        </p:par>
+                        <p:par>
+                          <p:cTn id="22" fill="hold">
+                            <p:stCondLst>
+                              <p:cond delay="500"/>
+                            </p:stCondLst>
+                            <p:childTnLst>
+                              <p:par>
+                                <p:cTn id="23" presetID="22" presetClass="entr" presetSubtype="2" fill="hold" grpId="0" nodeType="afterEffect">
+                                  <p:stCondLst>
+                                    <p:cond delay="0"/>
+                                  </p:stCondLst>
+                                  <p:childTnLst>
+                                    <p:set>
+                                      <p:cBhvr>
+                                        <p:cTn id="24" dur="1" fill="hold">
+                                          <p:stCondLst>
+                                            <p:cond delay="0"/>
+                                          </p:stCondLst>
+                                        </p:cTn>
+                                        <p:tgtEl>
+                                          <p:spTgt spid="17"/>
+                                        </p:tgtEl>
+                                        <p:attrNameLst>
+                                          <p:attrName>style.visibility</p:attrName>
+                                        </p:attrNameLst>
+                                      </p:cBhvr>
+                                      <p:to>
+                                        <p:strVal val="visible"/>
+                                      </p:to>
+                                    </p:set>
+                                    <p:animEffect transition="in" filter="wipe(right)">
+                                      <p:cBhvr>
+                                        <p:cTn id="25" dur="1000"/>
+                                        <p:tgtEl>
+                                          <p:spTgt spid="17"/>
+                                        </p:tgtEl>
+                                      </p:cBhvr>
+                                    </p:animEffect>
+                                  </p:childTnLst>
+                                </p:cTn>
+                              </p:par>
+                            </p:childTnLst>
+                          </p:cTn>
+                        </p:par>
+                      </p:childTnLst>
+                    </p:cTn>
+                  </p:par>
+                  <p:par>
+                    <p:cTn id="26" fill="hold">
+                      <p:stCondLst>
+                        <p:cond delay="indefinite"/>
+                      </p:stCondLst>
+                      <p:childTnLst>
+                        <p:par>
+                          <p:cTn id="27" fill="hold">
+                            <p:stCondLst>
+                              <p:cond delay="0"/>
+                            </p:stCondLst>
+                            <p:childTnLst>
+                              <p:par>
+                                <p:cTn id="28" presetID="9" presetClass="entr" presetSubtype="0" fill="hold" nodeType="clickEffect">
+                                  <p:stCondLst>
+                                    <p:cond delay="0"/>
+                                  </p:stCondLst>
+                                  <p:childTnLst>
+                                    <p:set>
+                                      <p:cBhvr>
+                                        <p:cTn id="29" dur="1" fill="hold">
+                                          <p:stCondLst>
+                                            <p:cond delay="0"/>
+                                          </p:stCondLst>
+                                        </p:cTn>
+                                        <p:tgtEl>
+                                          <p:spTgt spid="6"/>
+                                        </p:tgtEl>
+                                        <p:attrNameLst>
+                                          <p:attrName>style.visibility</p:attrName>
+                                        </p:attrNameLst>
+                                      </p:cBhvr>
+                                      <p:to>
+                                        <p:strVal val="visible"/>
+                                      </p:to>
+                                    </p:set>
+                                    <p:animEffect transition="in" filter="dissolve">
+                                      <p:cBhvr>
+                                        <p:cTn id="30" dur="500"/>
+                                        <p:tgtEl>
+                                          <p:spTgt spid="6"/>
+                                        </p:tgtEl>
+                                      </p:cBhvr>
+                                    </p:animEffect>
+                                  </p:childTnLst>
+                                </p:cTn>
+                              </p:par>
+                            </p:childTnLst>
+                          </p:cTn>
+                        </p:par>
+                        <p:par>
+                          <p:cTn id="31" fill="hold">
+                            <p:stCondLst>
+                              <p:cond delay="500"/>
+                            </p:stCondLst>
+                            <p:childTnLst>
+                              <p:par>
+                                <p:cTn id="32" presetID="9" presetClass="entr" presetSubtype="0" fill="hold" grpId="0" nodeType="afterEffect">
+                                  <p:stCondLst>
+                                    <p:cond delay="0"/>
+                                  </p:stCondLst>
+                                  <p:childTnLst>
+                                    <p:set>
+                                      <p:cBhvr>
+                                        <p:cTn id="33" dur="1" fill="hold">
+                                          <p:stCondLst>
+                                            <p:cond delay="0"/>
+                                          </p:stCondLst>
+                                        </p:cTn>
+                                        <p:tgtEl>
+                                          <p:spTgt spid="14"/>
+                                        </p:tgtEl>
+                                        <p:attrNameLst>
+                                          <p:attrName>style.visibility</p:attrName>
+                                        </p:attrNameLst>
+                                      </p:cBhvr>
+                                      <p:to>
+                                        <p:strVal val="visible"/>
+                                      </p:to>
+                                    </p:set>
+                                    <p:animEffect transition="in" filter="dissolve">
+                                      <p:cBhvr>
+                                        <p:cTn id="34" dur="500"/>
+                                        <p:tgtEl>
+                                          <p:spTgt spid="14"/>
+                                        </p:tgtEl>
+                                      </p:cBhvr>
+                                    </p:animEffect>
+                                  </p:childTnLst>
+                                </p:cTn>
+                              </p:par>
+                            </p:childTnLst>
+                          </p:cTn>
+                        </p:par>
+                      </p:childTnLst>
+                    </p:cTn>
+                  </p:par>
+                  <p:par>
+                    <p:cTn id="35" fill="hold">
+                      <p:stCondLst>
+                        <p:cond delay="indefinite"/>
+                      </p:stCondLst>
+                      <p:childTnLst>
+                        <p:par>
+                          <p:cTn id="36" fill="hold">
+                            <p:stCondLst>
+                              <p:cond delay="0"/>
+                            </p:stCondLst>
+                            <p:childTnLst>
+                              <p:par>
+                                <p:cTn id="37" presetID="22" presetClass="entr" presetSubtype="1" fill="hold" grpId="0" nodeType="clickEffect">
+                                  <p:stCondLst>
+                                    <p:cond delay="0"/>
+                                  </p:stCondLst>
+                                  <p:childTnLst>
+                                    <p:set>
+                                      <p:cBhvr>
+                                        <p:cTn id="38" dur="1" fill="hold">
+                                          <p:stCondLst>
+                                            <p:cond delay="0"/>
+                                          </p:stCondLst>
+                                        </p:cTn>
+                                        <p:tgtEl>
+                                          <p:spTgt spid="15"/>
+                                        </p:tgtEl>
+                                        <p:attrNameLst>
+                                          <p:attrName>style.visibility</p:attrName>
+                                        </p:attrNameLst>
+                                      </p:cBhvr>
+                                      <p:to>
+                                        <p:strVal val="visible"/>
+                                      </p:to>
+                                    </p:set>
+                                    <p:animEffect transition="in" filter="wipe(up)">
+                                      <p:cBhvr>
+                                        <p:cTn id="39" dur="1000"/>
+                                        <p:tgtEl>
+                                          <p:spTgt spid="15"/>
+                                        </p:tgtEl>
+                                      </p:cBhvr>
+                                    </p:animEffect>
+                                  </p:childTnLst>
+                                </p:cTn>
+                              </p:par>
+                            </p:childTnLst>
+                          </p:cTn>
+                        </p:par>
+                      </p:childTnLst>
+                    </p:cTn>
+                  </p:par>
+                  <p:par>
+                    <p:cTn id="40" fill="hold">
+                      <p:stCondLst>
+                        <p:cond delay="indefinite"/>
+                      </p:stCondLst>
+                      <p:childTnLst>
+                        <p:par>
+                          <p:cTn id="41" fill="hold">
+                            <p:stCondLst>
+                              <p:cond delay="0"/>
+                            </p:stCondLst>
+                            <p:childTnLst>
+                              <p:par>
+                                <p:cTn id="42" presetID="22" presetClass="entr" presetSubtype="8" fill="hold" nodeType="clickEffect">
+                                  <p:stCondLst>
+                                    <p:cond delay="0"/>
+                                  </p:stCondLst>
+                                  <p:childTnLst>
+                                    <p:set>
+                                      <p:cBhvr>
+                                        <p:cTn id="43" dur="1" fill="hold">
+                                          <p:stCondLst>
+                                            <p:cond delay="0"/>
+                                          </p:stCondLst>
+                                        </p:cTn>
+                                        <p:tgtEl>
+                                          <p:spTgt spid="19"/>
+                                        </p:tgtEl>
+                                        <p:attrNameLst>
+                                          <p:attrName>style.visibility</p:attrName>
+                                        </p:attrNameLst>
+                                      </p:cBhvr>
+                                      <p:to>
+                                        <p:strVal val="visible"/>
+                                      </p:to>
+                                    </p:set>
+                                    <p:animEffect transition="in" filter="wipe(left)">
+                                      <p:cBhvr>
+                                        <p:cTn id="44" dur="1000"/>
+                                        <p:tgtEl>
+                                          <p:spTgt spid="19"/>
+                                        </p:tgtEl>
+                                      </p:cBhvr>
+                                    </p:animEffect>
+                                  </p:childTnLst>
+                                </p:cTn>
+                              </p:par>
+                            </p:childTnLst>
+                          </p:cTn>
+                        </p:par>
+                        <p:par>
+                          <p:cTn id="45" fill="hold">
+                            <p:stCondLst>
+                              <p:cond delay="1000"/>
+                            </p:stCondLst>
+                            <p:childTnLst>
+                              <p:par>
+                                <p:cTn id="46" presetID="22" presetClass="entr" presetSubtype="4" fill="hold" nodeType="afterEffect">
+                                  <p:stCondLst>
+                                    <p:cond delay="0"/>
+                                  </p:stCondLst>
+                                  <p:childTnLst>
+                                    <p:set>
+                                      <p:cBhvr>
+                                        <p:cTn id="47" dur="1" fill="hold">
+                                          <p:stCondLst>
+                                            <p:cond delay="0"/>
+                                          </p:stCondLst>
+                                        </p:cTn>
+                                        <p:tgtEl>
+                                          <p:spTgt spid="21"/>
+                                        </p:tgtEl>
+                                        <p:attrNameLst>
+                                          <p:attrName>style.visibility</p:attrName>
+                                        </p:attrNameLst>
+                                      </p:cBhvr>
+                                      <p:to>
+                                        <p:strVal val="visible"/>
+                                      </p:to>
+                                    </p:set>
+                                    <p:animEffect transition="in" filter="wipe(down)">
+                                      <p:cBhvr>
+                                        <p:cTn id="48" dur="500"/>
+                                        <p:tgtEl>
+                                          <p:spTgt spid="21"/>
+                                        </p:tgtEl>
+                                      </p:cBhvr>
+                                    </p:animEffect>
+                                  </p:childTnLst>
+                                </p:cTn>
+                              </p:par>
+                            </p:childTnLst>
+                          </p:cTn>
+                        </p:par>
+                      </p:childTnLst>
+                    </p:cTn>
+                  </p:par>
+                </p:childTnLst>
+              </p:cTn>
+              <p:prevCondLst>
+                <p:cond evt="onPrev" delay="0">
+                  <p:tgtEl>
+                    <p:sldTgt/>
+                  </p:tgtEl>
+                </p:cond>
+              </p:prevCondLst>
+              <p:nextCondLst>
+                <p:cond evt="onNext" delay="0">
+                  <p:tgtEl>
+                    <p:sldTgt/>
+                  </p:tgtEl>
+                </p:cond>
+              </p:nextCondLst>
+            </p:seq>
+          </p:childTnLst>
+        </p:cTn>
+      </p:par>
+    </p:tnLst>
+    <p:bldLst>
+      <p:bldP spid="4099" grpId="0"/>
+      <p:bldP spid="11" grpId="0"/>
+      <p:bldP spid="13" grpId="0"/>
+      <p:bldP spid="17" grpId="0"/>
+      <p:bldP spid="18" grpId="0"/>
+      <p:bldP spid="14" grpId="0"/>
+      <p:bldP spid="15" grpId="0"/>
+    </p:bldLst>
+  </p:timing>
+</p:sld>
+</file>
+
+<file path=ppt/slides/slide9.xml><?xml version="1.0" encoding="utf-8"?>
+<p:sld xmlns:a="http://schemas.openxmlformats.org/drawingml/2006/main" xmlns:r="http://schemas.openxmlformats.org/officeDocument/2006/relationships" xmlns:p="http://schemas.openxmlformats.org/presentationml/2006/main" show="0">
   <p:cSld>
     <p:spTree>
       <p:nvGrpSpPr>
@@ -6863,7 +8730,7 @@
           <a:graphicData uri="http://schemas.openxmlformats.org/presentationml/2006/ole">
             <mc:AlternateContent xmlns:mc="http://schemas.openxmlformats.org/markup-compatibility/2006">
               <mc:Choice xmlns:v="urn:schemas-microsoft-com:vml" Requires="v">
-                <p:oleObj spid="_x0000_s96341" name="Equation" r:id="rId3" imgW="2222500" imgH="482600" progId="Equation.DSMT4">
+                <p:oleObj spid="_x0000_s96362" name="Equation" r:id="rId3" imgW="2222500" imgH="482600" progId="Equation.DSMT4">
                   <p:embed/>
                 </p:oleObj>
               </mc:Choice>
@@ -6943,7 +8810,7 @@
           <a:graphicData uri="http://schemas.openxmlformats.org/presentationml/2006/ole">
             <mc:AlternateContent xmlns:mc="http://schemas.openxmlformats.org/markup-compatibility/2006">
               <mc:Choice xmlns:v="urn:schemas-microsoft-com:vml" Requires="v">
-                <p:oleObj spid="_x0000_s96342" name="Equation" r:id="rId5" imgW="965200" imgH="495300" progId="Equation.DSMT4">
+                <p:oleObj spid="_x0000_s96363" name="Equation" r:id="rId5" imgW="965200" imgH="495300" progId="Equation.DSMT4">
                   <p:embed/>
                 </p:oleObj>
               </mc:Choice>
@@ -7025,7 +8892,7 @@
           <p:nvPr>
             <p:extLst>
               <p:ext uri="{D42A27DB-BD31-4B8C-83A1-F6EECF244321}">
-                <p14:modId xmlns:p14="http://schemas.microsoft.com/office/powerpoint/2010/main" val="1958381809"/>
+                <p14:modId xmlns:p14="http://schemas.microsoft.com/office/powerpoint/2010/main" val="1459208956"/>
               </p:ext>
             </p:extLst>
           </p:nvPr>
@@ -7038,7 +8905,7 @@
           <a:graphicData uri="http://schemas.openxmlformats.org/presentationml/2006/ole">
             <mc:AlternateContent xmlns:mc="http://schemas.openxmlformats.org/markup-compatibility/2006">
               <mc:Choice xmlns:v="urn:schemas-microsoft-com:vml" Requires="v">
-                <p:oleObj spid="_x0000_s96343" name="Equation" r:id="rId7" imgW="1536700" imgH="457200" progId="Equation.DSMT4">
+                <p:oleObj spid="_x0000_s96364" name="Equation" r:id="rId7" imgW="1536700" imgH="457200" progId="Equation.DSMT4">
                   <p:embed/>
                 </p:oleObj>
               </mc:Choice>
@@ -7095,7 +8962,7 @@
           <a:graphicData uri="http://schemas.openxmlformats.org/presentationml/2006/ole">
             <mc:AlternateContent xmlns:mc="http://schemas.openxmlformats.org/markup-compatibility/2006">
               <mc:Choice xmlns:v="urn:schemas-microsoft-com:vml" Requires="v">
-                <p:oleObj spid="_x0000_s96344" name="Equation" r:id="rId9" imgW="139700" imgH="215900" progId="Equation.DSMT4">
+                <p:oleObj spid="_x0000_s96365" name="Equation" r:id="rId9" imgW="139700" imgH="215900" progId="Equation.DSMT4">
                   <p:embed/>
                 </p:oleObj>
               </mc:Choice>
@@ -7152,7 +9019,7 @@
           <a:graphicData uri="http://schemas.openxmlformats.org/presentationml/2006/ole">
             <mc:AlternateContent xmlns:mc="http://schemas.openxmlformats.org/markup-compatibility/2006">
               <mc:Choice xmlns:v="urn:schemas-microsoft-com:vml" Requires="v">
-                <p:oleObj spid="_x0000_s96345" name="Equation" r:id="rId11" imgW="2044700" imgH="533400" progId="Equation.DSMT4">
+                <p:oleObj spid="_x0000_s96366" name="Equation" r:id="rId11" imgW="2044700" imgH="533400" progId="Equation.DSMT4">
                   <p:embed/>
                 </p:oleObj>
               </mc:Choice>
@@ -7197,13 +9064,13 @@
   <p:clrMapOvr>
     <a:masterClrMapping/>
   </p:clrMapOvr>
-  <mc:AlternateContent xmlns:mc="http://schemas.openxmlformats.org/markup-compatibility/2006" xmlns:p14="http://schemas.microsoft.com/office/powerpoint/2010/main">
-    <mc:Choice Requires="p14">
+  <mc:AlternateContent xmlns:mc="http://schemas.openxmlformats.org/markup-compatibility/2006">
+    <mc:Choice xmlns:p14="http://schemas.microsoft.com/office/powerpoint/2010/main" Requires="p14">
       <p:transition spd="med" p14:dur="700">
         <p:fade/>
       </p:transition>
     </mc:Choice>
-    <mc:Fallback xmlns="">
+    <mc:Fallback>
       <p:transition xmlns:p14="http://schemas.microsoft.com/office/powerpoint/2010/main" spd="med">
         <p:fade/>
       </p:transition>
@@ -7433,491 +9300,6 @@
             </p:seq>
           </p:childTnLst>
         </p:cTn>
-      </p:par>
-    </p:tnLst>
-  </p:timing>
-</p:sld>
-</file>
-
-<file path=ppt/slides/slide9.xml><?xml version="1.0" encoding="utf-8"?>
-<p:sld xmlns:a="http://schemas.openxmlformats.org/drawingml/2006/main" xmlns:r="http://schemas.openxmlformats.org/officeDocument/2006/relationships" xmlns:p="http://schemas.openxmlformats.org/presentationml/2006/main">
-  <p:cSld>
-    <p:spTree>
-      <p:nvGrpSpPr>
-        <p:cNvPr id="1" name=""/>
-        <p:cNvGrpSpPr/>
-        <p:nvPr/>
-      </p:nvGrpSpPr>
-      <p:grpSpPr>
-        <a:xfrm>
-          <a:off x="0" y="0"/>
-          <a:ext cx="0" cy="0"/>
-          <a:chOff x="0" y="0"/>
-          <a:chExt cx="0" cy="0"/>
-        </a:xfrm>
-      </p:grpSpPr>
-      <p:sp>
-        <p:nvSpPr>
-          <p:cNvPr id="56322" name="Rectangle 2"/>
-          <p:cNvSpPr>
-            <a:spLocks noGrp="1" noChangeArrowheads="1"/>
-          </p:cNvSpPr>
-          <p:nvPr>
-            <p:ph type="title"/>
-          </p:nvPr>
-        </p:nvSpPr>
-        <p:spPr/>
-        <p:txBody>
-          <a:bodyPr/>
-          <a:lstStyle/>
-          <a:p>
-            <a:r>
-              <a:rPr lang="en-US"/>
-              <a:t>Sum for Children</a:t>
-            </a:r>
-          </a:p>
-        </p:txBody>
-      </p:sp>
-      <p:sp>
-        <p:nvSpPr>
-          <p:cNvPr id="56330" name="Text Box 10"/>
-          <p:cNvSpPr txBox="1">
-            <a:spLocks noChangeArrowheads="1"/>
-          </p:cNvSpPr>
-          <p:nvPr/>
-        </p:nvSpPr>
-        <p:spPr bwMode="auto">
-          <a:xfrm>
-            <a:off x="914400" y="1611313"/>
-            <a:ext cx="2531237" cy="769441"/>
-          </a:xfrm>
-          <a:prstGeom prst="rect">
-            <a:avLst/>
-          </a:prstGeom>
-          <a:noFill/>
-          <a:ln>
-            <a:noFill/>
-          </a:ln>
-          <a:effectLst/>
-          <a:extLst>
-            <a:ext uri="{909E8E84-426E-40dd-AFC4-6F175D3DCCD1}">
-              <a14:hiddenFill xmlns:a14="http://schemas.microsoft.com/office/drawing/2010/main">
-                <a:solidFill>
-                  <a:schemeClr val="accent1"/>
-                </a:solidFill>
-              </a14:hiddenFill>
-            </a:ext>
-            <a:ext uri="{91240B29-F687-4f45-9708-019B960494DF}">
-              <a14:hiddenLine xmlns:a14="http://schemas.microsoft.com/office/drawing/2010/main" w="9525">
-                <a:solidFill>
-                  <a:schemeClr val="tx1"/>
-                </a:solidFill>
-                <a:miter lim="800000"/>
-                <a:headEnd/>
-                <a:tailEnd/>
-              </a14:hiddenLine>
-            </a:ext>
-            <a:ext uri="{AF507438-7753-43e0-B8FC-AC1667EBCBE1}">
-              <a14:hiddenEffects xmlns:a14="http://schemas.microsoft.com/office/drawing/2010/main">
-                <a:effectLst>
-                  <a:outerShdw blurRad="63500" dist="38099" dir="2700000" algn="ctr" rotWithShape="0">
-                    <a:schemeClr val="bg2">
-                      <a:alpha val="74998"/>
-                    </a:schemeClr>
-                  </a:outerShdw>
-                </a:effectLst>
-              </a14:hiddenEffects>
-            </a:ext>
-          </a:extLst>
-        </p:spPr>
-        <p:txBody>
-          <a:bodyPr wrap="none">
-            <a:spAutoFit/>
-          </a:bodyPr>
-          <a:lstStyle/>
-          <a:p>
-            <a:r>
-              <a:rPr lang="en-US" sz="4400" dirty="0">
-                <a:solidFill>
-                  <a:srgbClr val="9D007C"/>
-                </a:solidFill>
-                <a:latin typeface="Comic Sans MS" charset="0"/>
-              </a:rPr>
-              <a:t>Example:</a:t>
-            </a:r>
-          </a:p>
-        </p:txBody>
-      </p:sp>
-      <p:sp>
-        <p:nvSpPr>
-          <p:cNvPr id="56331" name="Text Box 11"/>
-          <p:cNvSpPr txBox="1">
-            <a:spLocks noChangeArrowheads="1"/>
-          </p:cNvSpPr>
-          <p:nvPr/>
-        </p:nvSpPr>
-        <p:spPr bwMode="auto">
-          <a:xfrm>
-            <a:off x="533400" y="2438400"/>
-            <a:ext cx="8077200" cy="1015663"/>
-          </a:xfrm>
-          <a:prstGeom prst="rect">
-            <a:avLst/>
-          </a:prstGeom>
-          <a:noFill/>
-          <a:ln>
-            <a:noFill/>
-          </a:ln>
-          <a:effectLst/>
-          <a:extLst>
-            <a:ext uri="{909E8E84-426E-40dd-AFC4-6F175D3DCCD1}">
-              <a14:hiddenFill xmlns:a14="http://schemas.microsoft.com/office/drawing/2010/main">
-                <a:solidFill>
-                  <a:schemeClr val="accent1"/>
-                </a:solidFill>
-              </a14:hiddenFill>
-            </a:ext>
-            <a:ext uri="{91240B29-F687-4f45-9708-019B960494DF}">
-              <a14:hiddenLine xmlns:a14="http://schemas.microsoft.com/office/drawing/2010/main" w="9525">
-                <a:solidFill>
-                  <a:schemeClr val="tx1"/>
-                </a:solidFill>
-                <a:miter lim="800000"/>
-                <a:headEnd/>
-                <a:tailEnd/>
-              </a14:hiddenLine>
-            </a:ext>
-            <a:ext uri="{AF507438-7753-43e0-B8FC-AC1667EBCBE1}">
-              <a14:hiddenEffects xmlns:a14="http://schemas.microsoft.com/office/drawing/2010/main">
-                <a:effectLst>
-                  <a:outerShdw blurRad="63500" dist="38099" dir="2700000" algn="ctr" rotWithShape="0">
-                    <a:schemeClr val="bg2">
-                      <a:alpha val="74998"/>
-                    </a:schemeClr>
-                  </a:outerShdw>
-                </a:effectLst>
-              </a14:hiddenEffects>
-            </a:ext>
-          </a:extLst>
-        </p:spPr>
-        <p:txBody>
-          <a:bodyPr wrap="square">
-            <a:spAutoFit/>
-          </a:bodyPr>
-          <a:lstStyle/>
-          <a:p>
-            <a:pPr eaLnBrk="1" hangingPunct="1">
-              <a:spcBef>
-                <a:spcPct val="20000"/>
-              </a:spcBef>
-            </a:pPr>
-            <a:r>
-              <a:rPr lang="en-US" sz="6000" dirty="0" smtClean="0">
-                <a:solidFill>
-                  <a:srgbClr val="3333FF"/>
-                </a:solidFill>
-                <a:latin typeface="Comic Sans MS" charset="0"/>
-              </a:rPr>
-              <a:t>1 </a:t>
-            </a:r>
-            <a:r>
-              <a:rPr lang="en-US" sz="6000" dirty="0">
-                <a:solidFill>
-                  <a:srgbClr val="3333FF"/>
-                </a:solidFill>
-                <a:latin typeface="Comic Sans MS" charset="0"/>
-              </a:rPr>
-              <a:t>+ 2 + </a:t>
-            </a:r>
-            <a:r>
-              <a:rPr lang="en-US" sz="6000" dirty="0" smtClean="0">
-                <a:solidFill>
-                  <a:srgbClr val="3333FF"/>
-                </a:solidFill>
-                <a:latin typeface="DFKaiShu-SB-Estd-BF"/>
-              </a:rPr>
-              <a:t>…</a:t>
-            </a:r>
-            <a:r>
-              <a:rPr lang="en-US" sz="6000" dirty="0" smtClean="0">
-                <a:solidFill>
-                  <a:srgbClr val="3333FF"/>
-                </a:solidFill>
-                <a:latin typeface="Comic Sans MS" charset="0"/>
-              </a:rPr>
-              <a:t> </a:t>
-            </a:r>
-            <a:r>
-              <a:rPr lang="en-US" sz="6000" dirty="0">
-                <a:solidFill>
-                  <a:srgbClr val="3333FF"/>
-                </a:solidFill>
-                <a:latin typeface="Comic Sans MS" charset="0"/>
-              </a:rPr>
-              <a:t>+ (</a:t>
-            </a:r>
-            <a:r>
-              <a:rPr lang="en-US" sz="6000" dirty="0" smtClean="0">
-                <a:solidFill>
-                  <a:srgbClr val="3333FF"/>
-                </a:solidFill>
-                <a:latin typeface="Comic Sans MS" charset="0"/>
-              </a:rPr>
-              <a:t>n</a:t>
-            </a:r>
-            <a:r>
-              <a:rPr lang="en-US" sz="6000" dirty="0" smtClean="0">
-                <a:solidFill>
-                  <a:srgbClr val="3333FF"/>
-                </a:solidFill>
-                <a:latin typeface="Comic Sans MS" charset="0"/>
-                <a:sym typeface="Symbol" charset="0"/>
-              </a:rPr>
-              <a:t>-</a:t>
-            </a:r>
-            <a:r>
-              <a:rPr lang="en-US" sz="6000" dirty="0" smtClean="0">
-                <a:solidFill>
-                  <a:srgbClr val="3333FF"/>
-                </a:solidFill>
-                <a:latin typeface="Comic Sans MS" charset="0"/>
-              </a:rPr>
-              <a:t>1</a:t>
-            </a:r>
-            <a:r>
-              <a:rPr lang="en-US" sz="6000" dirty="0">
-                <a:solidFill>
-                  <a:srgbClr val="3333FF"/>
-                </a:solidFill>
-                <a:latin typeface="Comic Sans MS" charset="0"/>
-              </a:rPr>
-              <a:t>) + n </a:t>
-            </a:r>
-            <a:r>
-              <a:rPr lang="en-US" sz="6000" b="1" dirty="0" smtClean="0">
-                <a:solidFill>
-                  <a:srgbClr val="3333FF"/>
-                </a:solidFill>
-                <a:latin typeface="Euclid Symbol" charset="2"/>
-                <a:cs typeface="Euclid Symbol" charset="2"/>
-              </a:rPr>
-              <a:t>=</a:t>
-            </a:r>
-            <a:endParaRPr lang="en-US" sz="2800" b="1" dirty="0">
-              <a:solidFill>
-                <a:srgbClr val="3333FF"/>
-              </a:solidFill>
-              <a:latin typeface="Euclid Symbol" charset="2"/>
-              <a:cs typeface="Euclid Symbol" charset="2"/>
-            </a:endParaRPr>
-          </a:p>
-        </p:txBody>
-      </p:sp>
-      <p:grpSp>
-        <p:nvGrpSpPr>
-          <p:cNvPr id="56337" name="Group 17"/>
-          <p:cNvGrpSpPr>
-            <a:grpSpLocks/>
-          </p:cNvGrpSpPr>
-          <p:nvPr/>
-        </p:nvGrpSpPr>
-        <p:grpSpPr bwMode="auto">
-          <a:xfrm>
-            <a:off x="3048000" y="3657600"/>
-            <a:ext cx="3124201" cy="1938338"/>
-            <a:chOff x="1920" y="2428"/>
-            <a:chExt cx="1968" cy="1221"/>
-          </a:xfrm>
-        </p:grpSpPr>
-        <p:sp>
-          <p:nvSpPr>
-            <p:cNvPr id="56333" name="Text Box 13"/>
-            <p:cNvSpPr txBox="1">
-              <a:spLocks noChangeArrowheads="1"/>
-            </p:cNvSpPr>
-            <p:nvPr/>
-          </p:nvSpPr>
-          <p:spPr bwMode="auto">
-            <a:xfrm>
-              <a:off x="1977" y="2428"/>
-              <a:ext cx="1911" cy="1221"/>
-            </a:xfrm>
-            <a:prstGeom prst="rect">
-              <a:avLst/>
-            </a:prstGeom>
-            <a:noFill/>
-            <a:ln>
-              <a:noFill/>
-            </a:ln>
-            <a:effectLst/>
-            <a:extLst>
-              <a:ext uri="{909E8E84-426E-40dd-AFC4-6F175D3DCCD1}">
-                <a14:hiddenFill xmlns:a14="http://schemas.microsoft.com/office/drawing/2010/main">
-                  <a:solidFill>
-                    <a:schemeClr val="accent1"/>
-                  </a:solidFill>
-                </a14:hiddenFill>
-              </a:ext>
-              <a:ext uri="{91240B29-F687-4f45-9708-019B960494DF}">
-                <a14:hiddenLine xmlns:a14="http://schemas.microsoft.com/office/drawing/2010/main" w="9525">
-                  <a:solidFill>
-                    <a:schemeClr val="tx1"/>
-                  </a:solidFill>
-                  <a:miter lim="800000"/>
-                  <a:headEnd/>
-                  <a:tailEnd/>
-                </a14:hiddenLine>
-              </a:ext>
-              <a:ext uri="{AF507438-7753-43e0-B8FC-AC1667EBCBE1}">
-                <a14:hiddenEffects xmlns:a14="http://schemas.microsoft.com/office/drawing/2010/main">
-                  <a:effectLst>
-                    <a:outerShdw blurRad="63500" dist="38099" dir="2700000" algn="ctr" rotWithShape="0">
-                      <a:schemeClr val="bg2">
-                        <a:alpha val="74998"/>
-                      </a:schemeClr>
-                    </a:outerShdw>
-                  </a:effectLst>
-                </a14:hiddenEffects>
-              </a:ext>
-            </a:extLst>
-          </p:spPr>
-          <p:txBody>
-            <a:bodyPr wrap="square">
-              <a:spAutoFit/>
-            </a:bodyPr>
-            <a:lstStyle/>
-            <a:p>
-              <a:r>
-                <a:rPr lang="en-US" sz="6000" dirty="0" smtClean="0">
-                  <a:solidFill>
-                    <a:srgbClr val="3333FF"/>
-                  </a:solidFill>
-                  <a:latin typeface="Comic Sans MS" charset="0"/>
-                </a:rPr>
-                <a:t>n</a:t>
-              </a:r>
-              <a:r>
-                <a:rPr lang="en-US" sz="5400" dirty="0">
-                  <a:solidFill>
-                    <a:srgbClr val="3333FF"/>
-                  </a:solidFill>
-                  <a:latin typeface="Comic Sans MS" charset="0"/>
-                </a:rPr>
-                <a:t>(</a:t>
-              </a:r>
-              <a:r>
-                <a:rPr lang="en-US" sz="6000" dirty="0">
-                  <a:solidFill>
-                    <a:srgbClr val="3333FF"/>
-                  </a:solidFill>
-                  <a:latin typeface="Comic Sans MS" charset="0"/>
-                </a:rPr>
-                <a:t>1+n)</a:t>
-              </a:r>
-            </a:p>
-            <a:p>
-              <a:r>
-                <a:rPr lang="en-US" sz="5400" i="1" dirty="0">
-                  <a:solidFill>
-                    <a:srgbClr val="3333FF"/>
-                  </a:solidFill>
-                  <a:latin typeface="Comic Sans MS" charset="0"/>
-                </a:rPr>
-                <a:t>    </a:t>
-              </a:r>
-              <a:r>
-                <a:rPr lang="en-US" sz="6000" dirty="0" smtClean="0">
-                  <a:solidFill>
-                    <a:srgbClr val="3333FF"/>
-                  </a:solidFill>
-                  <a:latin typeface="Comic Sans MS" charset="0"/>
-                </a:rPr>
-                <a:t>2</a:t>
-              </a:r>
-              <a:endParaRPr lang="en-US" sz="6000" dirty="0">
-                <a:solidFill>
-                  <a:srgbClr val="3333FF"/>
-                </a:solidFill>
-                <a:latin typeface="Comic Sans MS" charset="0"/>
-              </a:endParaRPr>
-            </a:p>
-          </p:txBody>
-        </p:sp>
-        <p:sp>
-          <p:nvSpPr>
-            <p:cNvPr id="56334" name="Line 14"/>
-            <p:cNvSpPr>
-              <a:spLocks noChangeShapeType="1"/>
-            </p:cNvSpPr>
-            <p:nvPr/>
-          </p:nvSpPr>
-          <p:spPr bwMode="auto">
-            <a:xfrm flipV="1">
-              <a:off x="1920" y="3072"/>
-              <a:ext cx="1536" cy="0"/>
-            </a:xfrm>
-            <a:prstGeom prst="line">
-              <a:avLst/>
-            </a:prstGeom>
-            <a:noFill/>
-            <a:ln w="31750">
-              <a:solidFill>
-                <a:srgbClr val="0000FF"/>
-              </a:solidFill>
-              <a:round/>
-              <a:headEnd/>
-              <a:tailEnd/>
-            </a:ln>
-            <a:effectLst/>
-            <a:extLst>
-              <a:ext uri="{909E8E84-426E-40dd-AFC4-6F175D3DCCD1}">
-                <a14:hiddenFill xmlns:a14="http://schemas.microsoft.com/office/drawing/2010/main">
-                  <a:noFill/>
-                </a14:hiddenFill>
-              </a:ext>
-              <a:ext uri="{AF507438-7753-43e0-B8FC-AC1667EBCBE1}">
-                <a14:hiddenEffects xmlns:a14="http://schemas.microsoft.com/office/drawing/2010/main">
-                  <a:effectLst>
-                    <a:outerShdw blurRad="63500" dist="38099" dir="2700000" algn="ctr" rotWithShape="0">
-                      <a:schemeClr val="bg2">
-                        <a:alpha val="74998"/>
-                      </a:schemeClr>
-                    </a:outerShdw>
-                  </a:effectLst>
-                </a14:hiddenEffects>
-              </a:ext>
-            </a:extLst>
-          </p:spPr>
-          <p:txBody>
-            <a:bodyPr/>
-            <a:lstStyle/>
-            <a:p>
-              <a:endParaRPr lang="en-US"/>
-            </a:p>
-          </p:txBody>
-        </p:sp>
-      </p:grpSp>
-    </p:spTree>
-  </p:cSld>
-  <p:clrMapOvr>
-    <a:masterClrMapping/>
-  </p:clrMapOvr>
-  <mc:AlternateContent xmlns:mc="http://schemas.openxmlformats.org/markup-compatibility/2006" xmlns:p14="http://schemas.microsoft.com/office/powerpoint/2010/main">
-    <mc:Choice Requires="p14">
-      <p:transition spd="slow" p14:dur="800">
-        <p:fade thruBlk="1"/>
-      </p:transition>
-    </mc:Choice>
-    <mc:Fallback xmlns="">
-      <p:transition xmlns:p14="http://schemas.microsoft.com/office/powerpoint/2010/main" spd="slow">
-        <p:fade thruBlk="1"/>
-      </p:transition>
-    </mc:Fallback>
-  </mc:AlternateContent>
-  <p:timing>
-    <p:tnLst>
-      <p:par>
-        <p:cTn xmlns:p14="http://schemas.microsoft.com/office/powerpoint/2010/main" id="1" dur="indefinite" restart="never" nodeType="tmRoot"/>
       </p:par>
     </p:tnLst>
   </p:timing>

</xml_diff>